<commit_message>
grammar rules for lesson 20 & 24 done
</commit_message>
<xml_diff>
--- a/public/docs/Reviews.pptx
+++ b/public/docs/Reviews.pptx
@@ -248,7 +248,7 @@
             <a:pPr rtl="0"/>
             <a:fld id="{9DC5279A-4D42-4957-B952-8AEA79243149}" type="datetime1">
               <a:rPr lang="en-GB" smtClean="0"/>
-              <a:t>24/07/2025</a:t>
+              <a:t>02/10/2025</a:t>
             </a:fld>
             <a:endParaRPr lang="en-GB"/>
           </a:p>
@@ -430,7 +430,7 @@
             <a:pPr rtl="0"/>
             <a:fld id="{07504B99-E122-4338-B6A6-EF721852AB96}" type="datetime1">
               <a:rPr lang="en-GB" noProof="0" smtClean="0"/>
-              <a:t>24/07/2025</a:t>
+              <a:t>02/10/2025</a:t>
             </a:fld>
             <a:endParaRPr lang="en-GB" noProof="0"/>
           </a:p>
@@ -2039,7 +2039,7 @@
             <a:pPr rtl="0"/>
             <a:fld id="{22531FCF-9EA0-4948-B3BA-41D4C749111E}" type="datetime1">
               <a:rPr lang="en-GB" noProof="0" smtClean="0"/>
-              <a:t>24/07/2025</a:t>
+              <a:t>02/10/2025</a:t>
             </a:fld>
             <a:endParaRPr lang="en-GB" noProof="0"/>
           </a:p>
@@ -2243,7 +2243,7 @@
             <a:pPr rtl="0"/>
             <a:fld id="{AEA218E7-6F34-4B85-9710-3564F06DECA4}" type="datetime1">
               <a:rPr lang="en-GB" noProof="0" smtClean="0"/>
-              <a:t>24/07/2025</a:t>
+              <a:t>02/10/2025</a:t>
             </a:fld>
             <a:endParaRPr lang="en-GB" noProof="0"/>
           </a:p>
@@ -2457,7 +2457,7 @@
             <a:pPr rtl="0"/>
             <a:fld id="{EC531974-393E-457E-B34E-F7F8AF171E56}" type="datetime1">
               <a:rPr lang="en-GB" noProof="0" smtClean="0"/>
-              <a:t>24/07/2025</a:t>
+              <a:t>02/10/2025</a:t>
             </a:fld>
             <a:endParaRPr lang="en-GB" noProof="0"/>
           </a:p>
@@ -2661,7 +2661,7 @@
             <a:pPr rtl="0"/>
             <a:fld id="{8BA2E906-192D-4717-94C6-19D0AF21F9AC}" type="datetime1">
               <a:rPr lang="en-GB" noProof="0" smtClean="0"/>
-              <a:t>24/07/2025</a:t>
+              <a:t>02/10/2025</a:t>
             </a:fld>
             <a:endParaRPr lang="en-GB" noProof="0"/>
           </a:p>
@@ -2941,7 +2941,7 @@
             <a:pPr rtl="0"/>
             <a:fld id="{44A33630-8D30-41A2-B646-94BE51F6CF33}" type="datetime1">
               <a:rPr lang="en-GB" noProof="0" smtClean="0"/>
-              <a:t>24/07/2025</a:t>
+              <a:t>02/10/2025</a:t>
             </a:fld>
             <a:endParaRPr lang="en-GB" noProof="0"/>
           </a:p>
@@ -3213,7 +3213,7 @@
             <a:pPr rtl="0"/>
             <a:fld id="{8243883E-3DE8-414A-8D5A-EC7335CD7EB1}" type="datetime1">
               <a:rPr lang="en-GB" noProof="0" smtClean="0"/>
-              <a:t>24/07/2025</a:t>
+              <a:t>02/10/2025</a:t>
             </a:fld>
             <a:endParaRPr lang="en-GB" noProof="0"/>
           </a:p>
@@ -3632,7 +3632,7 @@
             <a:pPr rtl="0"/>
             <a:fld id="{517E45AE-93CC-465B-AC29-280ECFB9E592}" type="datetime1">
               <a:rPr lang="en-GB" noProof="0" smtClean="0"/>
-              <a:t>24/07/2025</a:t>
+              <a:t>02/10/2025</a:t>
             </a:fld>
             <a:endParaRPr lang="en-GB" noProof="0"/>
           </a:p>
@@ -3778,7 +3778,7 @@
             <a:pPr rtl="0"/>
             <a:fld id="{9EC806A3-7FC9-4908-ADDC-2A4BF32E1033}" type="datetime1">
               <a:rPr lang="en-GB" noProof="0" smtClean="0"/>
-              <a:t>24/07/2025</a:t>
+              <a:t>02/10/2025</a:t>
             </a:fld>
             <a:endParaRPr lang="en-GB" noProof="0"/>
           </a:p>
@@ -3894,7 +3894,7 @@
             <a:pPr rtl="0"/>
             <a:fld id="{BBE79FC2-89D4-4B20-A266-ABE878E7A6CA}" type="datetime1">
               <a:rPr lang="en-GB" noProof="0" smtClean="0"/>
-              <a:t>24/07/2025</a:t>
+              <a:t>02/10/2025</a:t>
             </a:fld>
             <a:endParaRPr lang="en-GB" noProof="0"/>
           </a:p>
@@ -4211,7 +4211,7 @@
             <a:pPr rtl="0"/>
             <a:fld id="{FFC84638-7A06-4C29-A808-607AC6E92EFF}" type="datetime1">
               <a:rPr lang="en-GB" noProof="0" smtClean="0"/>
-              <a:t>24/07/2025</a:t>
+              <a:t>02/10/2025</a:t>
             </a:fld>
             <a:endParaRPr lang="en-GB" noProof="0"/>
           </a:p>
@@ -4509,7 +4509,7 @@
             <a:pPr rtl="0"/>
             <a:fld id="{7DEC0D12-BC96-4D3A-AEEA-216D95884D3A}" type="datetime1">
               <a:rPr lang="en-GB" noProof="0" smtClean="0"/>
-              <a:t>24/07/2025</a:t>
+              <a:t>02/10/2025</a:t>
             </a:fld>
             <a:endParaRPr lang="en-GB" noProof="0"/>
           </a:p>
@@ -4766,7 +4766,7 @@
             <a:pPr rtl="0"/>
             <a:fld id="{2E9A85F2-FB08-4945-8960-F6E1CDAD4E6B}" type="datetime1">
               <a:rPr lang="en-GB" noProof="0" smtClean="0"/>
-              <a:t>24/07/2025</a:t>
+              <a:t>02/10/2025</a:t>
             </a:fld>
             <a:endParaRPr lang="en-GB" noProof="0"/>
           </a:p>
@@ -5234,8 +5234,8 @@
         </p:nvSpPr>
         <p:spPr>
           <a:xfrm>
-            <a:off x="3448105" y="249530"/>
-            <a:ext cx="6425718" cy="492443"/>
+            <a:off x="3448105" y="187976"/>
+            <a:ext cx="6425718" cy="615553"/>
           </a:xfrm>
           <a:prstGeom prst="rect">
             <a:avLst/>
@@ -5250,13 +5250,15 @@
           <a:p>
             <a:pPr algn="ctr" rtl="0"/>
             <a:r>
-              <a:rPr lang="en-GB" sz="3200" b="1" dirty="0">
-                <a:latin typeface="+mj-lt"/>
+              <a:rPr lang="en-GB" sz="4000" b="1" dirty="0">
+                <a:latin typeface="Posterama" panose="020B0504020200020000" pitchFamily="34" charset="0"/>
+                <a:cs typeface="Posterama" panose="020B0504020200020000" pitchFamily="34" charset="0"/>
               </a:rPr>
               <a:t>PRESENT TENSE</a:t>
             </a:r>
-            <a:endParaRPr lang="en-GB" sz="3600" dirty="0">
-              <a:latin typeface="+mj-lt"/>
+            <a:endParaRPr lang="en-GB" sz="4400" dirty="0">
+              <a:latin typeface="Posterama" panose="020B0504020200020000" pitchFamily="34" charset="0"/>
+              <a:cs typeface="Posterama" panose="020B0504020200020000" pitchFamily="34" charset="0"/>
             </a:endParaRPr>
           </a:p>
         </p:txBody>
@@ -5275,8 +5277,8 @@
         </p:nvSpPr>
         <p:spPr>
           <a:xfrm>
-            <a:off x="3493308" y="763422"/>
-            <a:ext cx="6425717" cy="307777"/>
+            <a:off x="3012508" y="762679"/>
+            <a:ext cx="7296912" cy="369332"/>
           </a:xfrm>
           <a:prstGeom prst="rect">
             <a:avLst/>
@@ -5291,18 +5293,30 @@
           <a:p>
             <a:pPr algn="ctr" rtl="0"/>
             <a:r>
-              <a:rPr lang="uk-UA" sz="2000" dirty="0"/>
+              <a:rPr lang="uk-UA" sz="2400" dirty="0">
+                <a:latin typeface="Posterama" panose="020B0504020200020000" pitchFamily="34" charset="0"/>
+                <a:cs typeface="Posterama" panose="020B0504020200020000" pitchFamily="34" charset="0"/>
+              </a:rPr>
               <a:t>В</a:t>
             </a:r>
             <a:r>
-              <a:rPr lang="ru-RU" sz="2000" dirty="0"/>
+              <a:rPr lang="ru-RU" sz="2400" dirty="0">
+                <a:latin typeface="Posterama" panose="020B0504020200020000" pitchFamily="34" charset="0"/>
+                <a:cs typeface="Posterama" panose="020B0504020200020000" pitchFamily="34" charset="0"/>
+              </a:rPr>
               <a:t>иражає </a:t>
             </a:r>
             <a:r>
-              <a:rPr lang="ru-RU" sz="2000" b="1" dirty="0"/>
+              <a:rPr lang="ru-RU" sz="2400" b="1" dirty="0">
+                <a:latin typeface="Posterama" panose="020B0504020200020000" pitchFamily="34" charset="0"/>
+                <a:cs typeface="Posterama" panose="020B0504020200020000" pitchFamily="34" charset="0"/>
+              </a:rPr>
               <a:t>звичайну, регулярну або фактичну дію</a:t>
             </a:r>
-            <a:endParaRPr lang="en-GB" sz="2000" dirty="0"/>
+            <a:endParaRPr lang="en-GB" sz="2400" dirty="0">
+              <a:latin typeface="Posterama" panose="020B0504020200020000" pitchFamily="34" charset="0"/>
+              <a:cs typeface="Posterama" panose="020B0504020200020000" pitchFamily="34" charset="0"/>
+            </a:endParaRPr>
           </a:p>
         </p:txBody>
       </p:sp>
@@ -5328,13 +5342,13 @@
           </a:xfrm>
           <a:prstGeom prst="roundRect">
             <a:avLst>
-              <a:gd name="adj" fmla="val 50000"/>
+              <a:gd name="adj" fmla="val 33680"/>
             </a:avLst>
           </a:prstGeom>
           <a:solidFill>
-            <a:schemeClr val="accent1">
-              <a:alpha val="55000"/>
-            </a:schemeClr>
+            <a:srgbClr val="66B2B0">
+              <a:alpha val="54902"/>
+            </a:srgbClr>
           </a:solidFill>
           <a:ln w="9525">
             <a:noFill/>
@@ -5361,7 +5375,7 @@
           <a:lstStyle/>
           <a:p>
             <a:pPr algn="ctr" rtl="0"/>
-            <a:endParaRPr lang="en-GB"/>
+            <a:endParaRPr lang="en-GB" dirty="0"/>
           </a:p>
         </p:txBody>
       </p:sp>
@@ -5379,8 +5393,8 @@
         </p:nvSpPr>
         <p:spPr>
           <a:xfrm>
-            <a:off x="4095154" y="1604836"/>
-            <a:ext cx="720967" cy="246221"/>
+            <a:off x="3760737" y="1543281"/>
+            <a:ext cx="1389804" cy="369332"/>
           </a:xfrm>
           <a:prstGeom prst="rect">
             <a:avLst/>
@@ -5395,7 +5409,10 @@
           <a:p>
             <a:pPr algn="ctr" rtl="0"/>
             <a:r>
-              <a:rPr lang="en-GB" sz="1600" b="1" dirty="0"/>
+              <a:rPr lang="en-GB" sz="2400" b="1" dirty="0">
+                <a:latin typeface="Posterama" panose="020B0504020200020000" pitchFamily="34" charset="0"/>
+                <a:cs typeface="Posterama" panose="020B0504020200020000" pitchFamily="34" charset="0"/>
+              </a:rPr>
               <a:t>PRESENT</a:t>
             </a:r>
           </a:p>
@@ -5415,8 +5432,8 @@
         </p:nvSpPr>
         <p:spPr>
           <a:xfrm>
-            <a:off x="6387682" y="1604836"/>
-            <a:ext cx="388504" cy="246221"/>
+            <a:off x="6179581" y="1543281"/>
+            <a:ext cx="804707" cy="369332"/>
           </a:xfrm>
           <a:prstGeom prst="rect">
             <a:avLst/>
@@ -5431,7 +5448,10 @@
           <a:p>
             <a:pPr algn="ctr" rtl="0"/>
             <a:r>
-              <a:rPr lang="en-GB" sz="1600" b="1" dirty="0"/>
+              <a:rPr lang="en-GB" sz="2400" b="1" dirty="0">
+                <a:latin typeface="Posterama" panose="020B0504020200020000" pitchFamily="34" charset="0"/>
+                <a:cs typeface="Posterama" panose="020B0504020200020000" pitchFamily="34" charset="0"/>
+              </a:rPr>
               <a:t>PAST</a:t>
             </a:r>
           </a:p>
@@ -5451,8 +5471,8 @@
         </p:nvSpPr>
         <p:spPr>
           <a:xfrm>
-            <a:off x="8382017" y="1604836"/>
-            <a:ext cx="652423" cy="246221"/>
+            <a:off x="8091073" y="1543281"/>
+            <a:ext cx="1234313" cy="369332"/>
           </a:xfrm>
           <a:prstGeom prst="rect">
             <a:avLst/>
@@ -5467,7 +5487,10 @@
           <a:p>
             <a:pPr algn="ctr" rtl="0"/>
             <a:r>
-              <a:rPr lang="en-GB" sz="1600" b="1" dirty="0"/>
+              <a:rPr lang="en-GB" sz="2400" b="1" dirty="0">
+                <a:latin typeface="Posterama" panose="020B0504020200020000" pitchFamily="34" charset="0"/>
+                <a:cs typeface="Posterama" panose="020B0504020200020000" pitchFamily="34" charset="0"/>
+              </a:rPr>
               <a:t>FUTURE</a:t>
             </a:r>
           </a:p>
@@ -5495,15 +5518,13 @@
           </a:xfrm>
           <a:prstGeom prst="roundRect">
             <a:avLst>
-              <a:gd name="adj" fmla="val 50000"/>
+              <a:gd name="adj" fmla="val 28784"/>
             </a:avLst>
           </a:prstGeom>
           <a:solidFill>
-            <a:schemeClr val="tx2">
-              <a:lumMod val="40000"/>
-              <a:lumOff val="60000"/>
-              <a:alpha val="25000"/>
-            </a:schemeClr>
+            <a:srgbClr val="C7DFDC">
+              <a:alpha val="24706"/>
+            </a:srgbClr>
           </a:solidFill>
           <a:ln w="9525">
             <a:noFill/>
@@ -5556,13 +5577,13 @@
           </a:xfrm>
           <a:prstGeom prst="roundRect">
             <a:avLst>
-              <a:gd name="adj" fmla="val 50000"/>
+              <a:gd name="adj" fmla="val 30416"/>
             </a:avLst>
           </a:prstGeom>
           <a:solidFill>
-            <a:schemeClr val="accent1">
+            <a:srgbClr val="66B2B0">
               <a:alpha val="55000"/>
-            </a:schemeClr>
+            </a:srgbClr>
           </a:solidFill>
           <a:ln w="9525">
             <a:noFill/>
@@ -5607,8 +5628,8 @@
         </p:nvSpPr>
         <p:spPr>
           <a:xfrm>
-            <a:off x="1818563" y="2327876"/>
-            <a:ext cx="49693" cy="246221"/>
+            <a:off x="1793717" y="2266321"/>
+            <a:ext cx="99387" cy="369332"/>
           </a:xfrm>
           <a:prstGeom prst="rect">
             <a:avLst/>
@@ -5623,7 +5644,10 @@
           <a:p>
             <a:pPr algn="ctr" rtl="0"/>
             <a:r>
-              <a:rPr lang="en-GB" sz="1600" b="1" dirty="0"/>
+              <a:rPr lang="en-GB" sz="2400" b="1" dirty="0">
+                <a:latin typeface="Posterama" panose="020B0504020200020000" pitchFamily="34" charset="0"/>
+                <a:cs typeface="Posterama" panose="020B0504020200020000" pitchFamily="34" charset="0"/>
+              </a:rPr>
               <a:t>I</a:t>
             </a:r>
           </a:p>
@@ -5651,13 +5675,13 @@
           </a:xfrm>
           <a:prstGeom prst="roundRect">
             <a:avLst>
-              <a:gd name="adj" fmla="val 50000"/>
+              <a:gd name="adj" fmla="val 30416"/>
             </a:avLst>
           </a:prstGeom>
           <a:solidFill>
-            <a:schemeClr val="tx2">
-              <a:alpha val="55000"/>
-            </a:schemeClr>
+            <a:srgbClr val="C8DFDE">
+              <a:alpha val="54902"/>
+            </a:srgbClr>
           </a:solidFill>
           <a:ln w="9525">
             <a:noFill/>
@@ -5710,15 +5734,13 @@
           </a:xfrm>
           <a:prstGeom prst="roundRect">
             <a:avLst>
-              <a:gd name="adj" fmla="val 50000"/>
+              <a:gd name="adj" fmla="val 33680"/>
             </a:avLst>
           </a:prstGeom>
           <a:solidFill>
-            <a:schemeClr val="tx2">
-              <a:lumMod val="40000"/>
-              <a:lumOff val="60000"/>
+            <a:srgbClr val="C7DFDC">
               <a:alpha val="25000"/>
-            </a:schemeClr>
+            </a:srgbClr>
           </a:solidFill>
           <a:ln w="9525">
             <a:noFill/>
@@ -5763,8 +5785,8 @@
         </p:nvSpPr>
         <p:spPr>
           <a:xfrm>
-            <a:off x="1695195" y="3050915"/>
-            <a:ext cx="296428" cy="246221"/>
+            <a:off x="1551663" y="2989360"/>
+            <a:ext cx="583494" cy="369332"/>
           </a:xfrm>
           <a:prstGeom prst="rect">
             <a:avLst/>
@@ -5779,7 +5801,10 @@
           <a:p>
             <a:pPr algn="ctr" rtl="0"/>
             <a:r>
-              <a:rPr lang="en-GB" sz="1600" b="1" dirty="0"/>
+              <a:rPr lang="en-GB" sz="2400" b="1" dirty="0">
+                <a:latin typeface="Posterama" panose="020B0504020200020000" pitchFamily="34" charset="0"/>
+                <a:cs typeface="Posterama" panose="020B0504020200020000" pitchFamily="34" charset="0"/>
+              </a:rPr>
               <a:t>You</a:t>
             </a:r>
           </a:p>
@@ -5807,13 +5832,13 @@
           </a:xfrm>
           <a:prstGeom prst="roundRect">
             <a:avLst>
-              <a:gd name="adj" fmla="val 50000"/>
+              <a:gd name="adj" fmla="val 25520"/>
             </a:avLst>
           </a:prstGeom>
           <a:solidFill>
-            <a:schemeClr val="accent1">
+            <a:srgbClr val="66B2B0">
               <a:alpha val="55000"/>
-            </a:schemeClr>
+            </a:srgbClr>
           </a:solidFill>
           <a:ln w="9525">
             <a:noFill/>
@@ -5866,15 +5891,13 @@
           </a:xfrm>
           <a:prstGeom prst="roundRect">
             <a:avLst>
-              <a:gd name="adj" fmla="val 50000"/>
+              <a:gd name="adj" fmla="val 28784"/>
             </a:avLst>
           </a:prstGeom>
           <a:solidFill>
-            <a:schemeClr val="tx2">
-              <a:lumMod val="40000"/>
-              <a:lumOff val="60000"/>
+            <a:srgbClr val="C7DFDC">
               <a:alpha val="25000"/>
-            </a:schemeClr>
+            </a:srgbClr>
           </a:solidFill>
           <a:ln w="9525">
             <a:noFill/>
@@ -5919,8 +5942,8 @@
         </p:nvSpPr>
         <p:spPr>
           <a:xfrm>
-            <a:off x="1452279" y="3773955"/>
-            <a:ext cx="782266" cy="246221"/>
+            <a:off x="1112444" y="3712400"/>
+            <a:ext cx="1461939" cy="369332"/>
           </a:xfrm>
           <a:prstGeom prst="rect">
             <a:avLst/>
@@ -5935,7 +5958,10 @@
           <a:p>
             <a:pPr algn="ctr" rtl="0"/>
             <a:r>
-              <a:rPr lang="en-GB" sz="1600" b="1" dirty="0"/>
+              <a:rPr lang="en-GB" sz="2400" b="1" dirty="0">
+                <a:latin typeface="Posterama" panose="020B0504020200020000" pitchFamily="34" charset="0"/>
+                <a:cs typeface="Posterama" panose="020B0504020200020000" pitchFamily="34" charset="0"/>
+              </a:rPr>
               <a:t>He/She/It</a:t>
             </a:r>
           </a:p>
@@ -5963,13 +5989,13 @@
           </a:xfrm>
           <a:prstGeom prst="roundRect">
             <a:avLst>
-              <a:gd name="adj" fmla="val 50000"/>
+              <a:gd name="adj" fmla="val 23888"/>
             </a:avLst>
           </a:prstGeom>
           <a:solidFill>
-            <a:schemeClr val="tx2">
+            <a:srgbClr val="C8DFDE">
               <a:alpha val="55000"/>
-            </a:schemeClr>
+            </a:srgbClr>
           </a:solidFill>
           <a:ln w="9525">
             <a:noFill/>
@@ -6022,15 +6048,13 @@
           </a:xfrm>
           <a:prstGeom prst="roundRect">
             <a:avLst>
-              <a:gd name="adj" fmla="val 50000"/>
+              <a:gd name="adj" fmla="val 30416"/>
             </a:avLst>
           </a:prstGeom>
           <a:solidFill>
-            <a:schemeClr val="tx2">
-              <a:lumMod val="40000"/>
-              <a:lumOff val="60000"/>
+            <a:srgbClr val="C7DFDC">
               <a:alpha val="25000"/>
-            </a:schemeClr>
+            </a:srgbClr>
           </a:solidFill>
           <a:ln w="9525">
             <a:noFill/>
@@ -6075,8 +6099,8 @@
         </p:nvSpPr>
         <p:spPr>
           <a:xfrm>
-            <a:off x="1706096" y="4496995"/>
-            <a:ext cx="274627" cy="246221"/>
+            <a:off x="1606166" y="4435440"/>
+            <a:ext cx="474490" cy="369332"/>
           </a:xfrm>
           <a:prstGeom prst="rect">
             <a:avLst/>
@@ -6091,7 +6115,10 @@
           <a:p>
             <a:pPr algn="ctr" rtl="0"/>
             <a:r>
-              <a:rPr lang="en-GB" sz="1600" b="1" dirty="0"/>
+              <a:rPr lang="en-GB" sz="2400" b="1" dirty="0">
+                <a:latin typeface="Posterama" panose="020B0504020200020000" pitchFamily="34" charset="0"/>
+                <a:cs typeface="Posterama" panose="020B0504020200020000" pitchFamily="34" charset="0"/>
+              </a:rPr>
               <a:t>We</a:t>
             </a:r>
           </a:p>
@@ -6149,13 +6176,13 @@
           </a:xfrm>
           <a:prstGeom prst="roundRect">
             <a:avLst>
-              <a:gd name="adj" fmla="val 50000"/>
+              <a:gd name="adj" fmla="val 38576"/>
             </a:avLst>
           </a:prstGeom>
           <a:solidFill>
-            <a:schemeClr val="tx2">
+            <a:srgbClr val="66B2B0">
               <a:alpha val="55000"/>
-            </a:schemeClr>
+            </a:srgbClr>
           </a:solidFill>
           <a:ln w="9525">
             <a:noFill/>
@@ -6208,15 +6235,13 @@
           </a:xfrm>
           <a:prstGeom prst="roundRect">
             <a:avLst>
-              <a:gd name="adj" fmla="val 50000"/>
+              <a:gd name="adj" fmla="val 33680"/>
             </a:avLst>
           </a:prstGeom>
           <a:solidFill>
-            <a:schemeClr val="tx2">
-              <a:lumMod val="40000"/>
-              <a:lumOff val="60000"/>
+            <a:srgbClr val="C7DFDC">
               <a:alpha val="25000"/>
-            </a:schemeClr>
+            </a:srgbClr>
           </a:solidFill>
           <a:ln w="9525">
             <a:noFill/>
@@ -6261,8 +6286,8 @@
         </p:nvSpPr>
         <p:spPr>
           <a:xfrm>
-            <a:off x="1645149" y="5287088"/>
-            <a:ext cx="396520" cy="246221"/>
+            <a:off x="1478726" y="5225533"/>
+            <a:ext cx="729367" cy="369332"/>
           </a:xfrm>
           <a:prstGeom prst="rect">
             <a:avLst/>
@@ -6277,7 +6302,10 @@
           <a:p>
             <a:pPr algn="ctr" rtl="0"/>
             <a:r>
-              <a:rPr lang="en-GB" sz="1600" b="1" dirty="0"/>
+              <a:rPr lang="en-GB" sz="2400" b="1" dirty="0">
+                <a:latin typeface="Posterama" panose="020B0504020200020000" pitchFamily="34" charset="0"/>
+                <a:cs typeface="Posterama" panose="020B0504020200020000" pitchFamily="34" charset="0"/>
+              </a:rPr>
               <a:t>They</a:t>
             </a:r>
           </a:p>
@@ -6297,8 +6325,8 @@
         </p:nvSpPr>
         <p:spPr>
           <a:xfrm>
-            <a:off x="4251446" y="2327876"/>
-            <a:ext cx="408382" cy="246221"/>
+            <a:off x="4097367" y="2266321"/>
+            <a:ext cx="716543" cy="369332"/>
           </a:xfrm>
           <a:prstGeom prst="rect">
             <a:avLst/>
@@ -6313,7 +6341,10 @@
           <a:p>
             <a:pPr algn="ctr" rtl="0"/>
             <a:r>
-              <a:rPr lang="en-GB" sz="1600" dirty="0"/>
+              <a:rPr lang="en-GB" sz="2400" dirty="0">
+                <a:latin typeface="Posterama" panose="020B0504020200020000" pitchFamily="34" charset="0"/>
+                <a:cs typeface="Posterama" panose="020B0504020200020000" pitchFamily="34" charset="0"/>
+              </a:rPr>
               <a:t>work</a:t>
             </a:r>
           </a:p>
@@ -6333,8 +6364,8 @@
         </p:nvSpPr>
         <p:spPr>
           <a:xfrm>
-            <a:off x="6277043" y="2327876"/>
-            <a:ext cx="609783" cy="246221"/>
+            <a:off x="6044127" y="2266321"/>
+            <a:ext cx="1075615" cy="369332"/>
           </a:xfrm>
           <a:prstGeom prst="rect">
             <a:avLst/>
@@ -6349,11 +6380,17 @@
           <a:p>
             <a:pPr algn="ctr" rtl="0"/>
             <a:r>
-              <a:rPr lang="en-GB" sz="1600" dirty="0"/>
+              <a:rPr lang="en-GB" sz="2400" dirty="0">
+                <a:latin typeface="Posterama" panose="020B0504020200020000" pitchFamily="34" charset="0"/>
+                <a:cs typeface="Posterama" panose="020B0504020200020000" pitchFamily="34" charset="0"/>
+              </a:rPr>
               <a:t>work</a:t>
             </a:r>
             <a:r>
-              <a:rPr lang="en-GB" sz="1600" b="1" u="sng" dirty="0"/>
+              <a:rPr lang="en-GB" sz="2400" b="1" u="sng" dirty="0">
+                <a:latin typeface="Posterama" panose="020B0504020200020000" pitchFamily="34" charset="0"/>
+                <a:cs typeface="Posterama" panose="020B0504020200020000" pitchFamily="34" charset="0"/>
+              </a:rPr>
               <a:t>ed</a:t>
             </a:r>
           </a:p>
@@ -6373,8 +6410,8 @@
         </p:nvSpPr>
         <p:spPr>
           <a:xfrm>
-            <a:off x="8342135" y="2327876"/>
-            <a:ext cx="732188" cy="246221"/>
+            <a:off x="8039778" y="2266321"/>
+            <a:ext cx="1336904" cy="369332"/>
           </a:xfrm>
           <a:prstGeom prst="rect">
             <a:avLst/>
@@ -6389,11 +6426,17 @@
           <a:p>
             <a:pPr algn="ctr" rtl="0"/>
             <a:r>
-              <a:rPr lang="en-GB" sz="1600" b="1" dirty="0"/>
+              <a:rPr lang="en-GB" sz="2400" b="1" dirty="0">
+                <a:latin typeface="Posterama" panose="020B0504020200020000" pitchFamily="34" charset="0"/>
+                <a:cs typeface="Posterama" panose="020B0504020200020000" pitchFamily="34" charset="0"/>
+              </a:rPr>
               <a:t>will</a:t>
             </a:r>
             <a:r>
-              <a:rPr lang="en-GB" sz="1600" dirty="0"/>
+              <a:rPr lang="en-GB" sz="2400" dirty="0">
+                <a:latin typeface="Posterama" panose="020B0504020200020000" pitchFamily="34" charset="0"/>
+                <a:cs typeface="Posterama" panose="020B0504020200020000" pitchFamily="34" charset="0"/>
+              </a:rPr>
               <a:t> work</a:t>
             </a:r>
           </a:p>
@@ -6413,8 +6456,8 @@
         </p:nvSpPr>
         <p:spPr>
           <a:xfrm>
-            <a:off x="4251446" y="3037697"/>
-            <a:ext cx="408382" cy="246221"/>
+            <a:off x="4097367" y="2976142"/>
+            <a:ext cx="716543" cy="369332"/>
           </a:xfrm>
           <a:prstGeom prst="rect">
             <a:avLst/>
@@ -6429,7 +6472,10 @@
           <a:p>
             <a:pPr algn="ctr" rtl="0"/>
             <a:r>
-              <a:rPr lang="en-GB" sz="1600" dirty="0"/>
+              <a:rPr lang="en-GB" sz="2400" dirty="0">
+                <a:latin typeface="Posterama" panose="020B0504020200020000" pitchFamily="34" charset="0"/>
+                <a:cs typeface="Posterama" panose="020B0504020200020000" pitchFamily="34" charset="0"/>
+              </a:rPr>
               <a:t>work</a:t>
             </a:r>
           </a:p>
@@ -6449,8 +6495,8 @@
         </p:nvSpPr>
         <p:spPr>
           <a:xfrm>
-            <a:off x="6277043" y="3037697"/>
-            <a:ext cx="609783" cy="246221"/>
+            <a:off x="6044127" y="2976142"/>
+            <a:ext cx="1075615" cy="369332"/>
           </a:xfrm>
           <a:prstGeom prst="rect">
             <a:avLst/>
@@ -6465,11 +6511,17 @@
           <a:p>
             <a:pPr algn="ctr" rtl="0"/>
             <a:r>
-              <a:rPr lang="en-GB" sz="1600" dirty="0"/>
+              <a:rPr lang="en-GB" sz="2400" dirty="0">
+                <a:latin typeface="Posterama" panose="020B0504020200020000" pitchFamily="34" charset="0"/>
+                <a:cs typeface="Posterama" panose="020B0504020200020000" pitchFamily="34" charset="0"/>
+              </a:rPr>
               <a:t>work</a:t>
             </a:r>
             <a:r>
-              <a:rPr lang="en-GB" sz="1600" b="1" u="sng" dirty="0"/>
+              <a:rPr lang="en-GB" sz="2400" b="1" u="sng" dirty="0">
+                <a:latin typeface="Posterama" panose="020B0504020200020000" pitchFamily="34" charset="0"/>
+                <a:cs typeface="Posterama" panose="020B0504020200020000" pitchFamily="34" charset="0"/>
+              </a:rPr>
               <a:t>ed</a:t>
             </a:r>
           </a:p>
@@ -6489,8 +6541,8 @@
         </p:nvSpPr>
         <p:spPr>
           <a:xfrm>
-            <a:off x="8342135" y="3037697"/>
-            <a:ext cx="732188" cy="246221"/>
+            <a:off x="8039778" y="2976142"/>
+            <a:ext cx="1336904" cy="369332"/>
           </a:xfrm>
           <a:prstGeom prst="rect">
             <a:avLst/>
@@ -6505,11 +6557,17 @@
           <a:p>
             <a:pPr algn="ctr" rtl="0"/>
             <a:r>
-              <a:rPr lang="en-GB" sz="1600" b="1" dirty="0"/>
+              <a:rPr lang="en-GB" sz="2400" b="1" dirty="0">
+                <a:latin typeface="Posterama" panose="020B0504020200020000" pitchFamily="34" charset="0"/>
+                <a:cs typeface="Posterama" panose="020B0504020200020000" pitchFamily="34" charset="0"/>
+              </a:rPr>
               <a:t>will</a:t>
             </a:r>
             <a:r>
-              <a:rPr lang="en-GB" sz="1600" dirty="0"/>
+              <a:rPr lang="en-GB" sz="2400" dirty="0">
+                <a:latin typeface="Posterama" panose="020B0504020200020000" pitchFamily="34" charset="0"/>
+                <a:cs typeface="Posterama" panose="020B0504020200020000" pitchFamily="34" charset="0"/>
+              </a:rPr>
               <a:t> work</a:t>
             </a:r>
           </a:p>
@@ -6529,8 +6587,8 @@
         </p:nvSpPr>
         <p:spPr>
           <a:xfrm>
-            <a:off x="4212365" y="3773955"/>
-            <a:ext cx="486544" cy="246221"/>
+            <a:off x="4022026" y="3712400"/>
+            <a:ext cx="867225" cy="369332"/>
           </a:xfrm>
           <a:prstGeom prst="rect">
             <a:avLst/>
@@ -6545,11 +6603,17 @@
           <a:p>
             <a:pPr algn="ctr" rtl="0"/>
             <a:r>
-              <a:rPr lang="en-GB" sz="1600" dirty="0"/>
+              <a:rPr lang="en-GB" sz="2400" dirty="0">
+                <a:latin typeface="Posterama" panose="020B0504020200020000" pitchFamily="34" charset="0"/>
+                <a:cs typeface="Posterama" panose="020B0504020200020000" pitchFamily="34" charset="0"/>
+              </a:rPr>
               <a:t>work</a:t>
             </a:r>
             <a:r>
-              <a:rPr lang="en-GB" sz="1600" b="1" u="sng" dirty="0"/>
+              <a:rPr lang="en-GB" sz="2400" b="1" u="sng" dirty="0">
+                <a:latin typeface="Posterama" panose="020B0504020200020000" pitchFamily="34" charset="0"/>
+                <a:cs typeface="Posterama" panose="020B0504020200020000" pitchFamily="34" charset="0"/>
+              </a:rPr>
               <a:t>s</a:t>
             </a:r>
           </a:p>
@@ -6569,8 +6633,8 @@
         </p:nvSpPr>
         <p:spPr>
           <a:xfrm>
-            <a:off x="6277043" y="3773955"/>
-            <a:ext cx="609783" cy="246221"/>
+            <a:off x="6044127" y="3712400"/>
+            <a:ext cx="1075615" cy="369332"/>
           </a:xfrm>
           <a:prstGeom prst="rect">
             <a:avLst/>
@@ -6585,11 +6649,17 @@
           <a:p>
             <a:pPr algn="ctr" rtl="0"/>
             <a:r>
-              <a:rPr lang="en-GB" sz="1600" dirty="0"/>
+              <a:rPr lang="en-GB" sz="2400" dirty="0">
+                <a:latin typeface="Posterama" panose="020B0504020200020000" pitchFamily="34" charset="0"/>
+                <a:cs typeface="Posterama" panose="020B0504020200020000" pitchFamily="34" charset="0"/>
+              </a:rPr>
               <a:t>work</a:t>
             </a:r>
             <a:r>
-              <a:rPr lang="en-GB" sz="1600" b="1" u="sng" dirty="0"/>
+              <a:rPr lang="en-GB" sz="2400" b="1" u="sng" dirty="0">
+                <a:latin typeface="Posterama" panose="020B0504020200020000" pitchFamily="34" charset="0"/>
+                <a:cs typeface="Posterama" panose="020B0504020200020000" pitchFamily="34" charset="0"/>
+              </a:rPr>
               <a:t>ed</a:t>
             </a:r>
           </a:p>
@@ -6609,8 +6679,8 @@
         </p:nvSpPr>
         <p:spPr>
           <a:xfrm>
-            <a:off x="8342135" y="3773955"/>
-            <a:ext cx="732188" cy="246221"/>
+            <a:off x="8039778" y="3712400"/>
+            <a:ext cx="1336904" cy="369332"/>
           </a:xfrm>
           <a:prstGeom prst="rect">
             <a:avLst/>
@@ -6625,11 +6695,17 @@
           <a:p>
             <a:pPr algn="ctr" rtl="0"/>
             <a:r>
-              <a:rPr lang="en-GB" sz="1600" b="1" dirty="0"/>
+              <a:rPr lang="en-GB" sz="2400" b="1" dirty="0">
+                <a:latin typeface="Posterama" panose="020B0504020200020000" pitchFamily="34" charset="0"/>
+                <a:cs typeface="Posterama" panose="020B0504020200020000" pitchFamily="34" charset="0"/>
+              </a:rPr>
               <a:t>will</a:t>
             </a:r>
             <a:r>
-              <a:rPr lang="en-GB" sz="1600" dirty="0"/>
+              <a:rPr lang="en-GB" sz="2400" dirty="0">
+                <a:latin typeface="Posterama" panose="020B0504020200020000" pitchFamily="34" charset="0"/>
+                <a:cs typeface="Posterama" panose="020B0504020200020000" pitchFamily="34" charset="0"/>
+              </a:rPr>
               <a:t> work</a:t>
             </a:r>
           </a:p>
@@ -6649,8 +6725,8 @@
         </p:nvSpPr>
         <p:spPr>
           <a:xfrm>
-            <a:off x="4251446" y="4493796"/>
-            <a:ext cx="408382" cy="246221"/>
+            <a:off x="4097367" y="4432241"/>
+            <a:ext cx="716543" cy="369332"/>
           </a:xfrm>
           <a:prstGeom prst="rect">
             <a:avLst/>
@@ -6665,7 +6741,10 @@
           <a:p>
             <a:pPr algn="ctr" rtl="0"/>
             <a:r>
-              <a:rPr lang="en-GB" sz="1600" dirty="0"/>
+              <a:rPr lang="en-GB" sz="2400" dirty="0">
+                <a:latin typeface="Posterama" panose="020B0504020200020000" pitchFamily="34" charset="0"/>
+                <a:cs typeface="Posterama" panose="020B0504020200020000" pitchFamily="34" charset="0"/>
+              </a:rPr>
               <a:t>work</a:t>
             </a:r>
           </a:p>
@@ -6685,8 +6764,8 @@
         </p:nvSpPr>
         <p:spPr>
           <a:xfrm>
-            <a:off x="6277043" y="4493796"/>
-            <a:ext cx="609783" cy="246221"/>
+            <a:off x="6044127" y="4432241"/>
+            <a:ext cx="1075615" cy="369332"/>
           </a:xfrm>
           <a:prstGeom prst="rect">
             <a:avLst/>
@@ -6701,11 +6780,17 @@
           <a:p>
             <a:pPr algn="ctr" rtl="0"/>
             <a:r>
-              <a:rPr lang="en-GB" sz="1600" dirty="0"/>
+              <a:rPr lang="en-GB" sz="2400" dirty="0">
+                <a:latin typeface="Posterama" panose="020B0504020200020000" pitchFamily="34" charset="0"/>
+                <a:cs typeface="Posterama" panose="020B0504020200020000" pitchFamily="34" charset="0"/>
+              </a:rPr>
               <a:t>work</a:t>
             </a:r>
             <a:r>
-              <a:rPr lang="en-GB" sz="1600" b="1" u="sng" dirty="0"/>
+              <a:rPr lang="en-GB" sz="2400" b="1" u="sng" dirty="0">
+                <a:latin typeface="Posterama" panose="020B0504020200020000" pitchFamily="34" charset="0"/>
+                <a:cs typeface="Posterama" panose="020B0504020200020000" pitchFamily="34" charset="0"/>
+              </a:rPr>
               <a:t>ed</a:t>
             </a:r>
           </a:p>
@@ -6725,8 +6810,8 @@
         </p:nvSpPr>
         <p:spPr>
           <a:xfrm>
-            <a:off x="8342135" y="4493796"/>
-            <a:ext cx="732188" cy="246221"/>
+            <a:off x="8039778" y="4432241"/>
+            <a:ext cx="1336904" cy="369332"/>
           </a:xfrm>
           <a:prstGeom prst="rect">
             <a:avLst/>
@@ -6741,11 +6826,17 @@
           <a:p>
             <a:pPr algn="ctr" rtl="0"/>
             <a:r>
-              <a:rPr lang="en-GB" sz="1600" b="1" dirty="0"/>
+              <a:rPr lang="en-GB" sz="2400" b="1" dirty="0">
+                <a:latin typeface="Posterama" panose="020B0504020200020000" pitchFamily="34" charset="0"/>
+                <a:cs typeface="Posterama" panose="020B0504020200020000" pitchFamily="34" charset="0"/>
+              </a:rPr>
               <a:t>will</a:t>
             </a:r>
             <a:r>
-              <a:rPr lang="en-GB" sz="1600" dirty="0"/>
+              <a:rPr lang="en-GB" sz="2400" dirty="0">
+                <a:latin typeface="Posterama" panose="020B0504020200020000" pitchFamily="34" charset="0"/>
+                <a:cs typeface="Posterama" panose="020B0504020200020000" pitchFamily="34" charset="0"/>
+              </a:rPr>
               <a:t> work</a:t>
             </a:r>
           </a:p>
@@ -6765,8 +6856,8 @@
         </p:nvSpPr>
         <p:spPr>
           <a:xfrm>
-            <a:off x="4251446" y="5287088"/>
-            <a:ext cx="408382" cy="246221"/>
+            <a:off x="4097367" y="5225533"/>
+            <a:ext cx="716543" cy="369332"/>
           </a:xfrm>
           <a:prstGeom prst="rect">
             <a:avLst/>
@@ -6781,7 +6872,10 @@
           <a:p>
             <a:pPr algn="ctr" rtl="0"/>
             <a:r>
-              <a:rPr lang="en-GB" sz="1600" dirty="0"/>
+              <a:rPr lang="en-GB" sz="2400" dirty="0">
+                <a:latin typeface="Posterama" panose="020B0504020200020000" pitchFamily="34" charset="0"/>
+                <a:cs typeface="Posterama" panose="020B0504020200020000" pitchFamily="34" charset="0"/>
+              </a:rPr>
               <a:t>work</a:t>
             </a:r>
           </a:p>
@@ -6801,8 +6895,8 @@
         </p:nvSpPr>
         <p:spPr>
           <a:xfrm>
-            <a:off x="6277043" y="5287088"/>
-            <a:ext cx="609783" cy="246221"/>
+            <a:off x="6044127" y="5225533"/>
+            <a:ext cx="1075615" cy="369332"/>
           </a:xfrm>
           <a:prstGeom prst="rect">
             <a:avLst/>
@@ -6817,11 +6911,17 @@
           <a:p>
             <a:pPr algn="ctr" rtl="0"/>
             <a:r>
-              <a:rPr lang="en-GB" sz="1600" dirty="0"/>
+              <a:rPr lang="en-GB" sz="2400" dirty="0">
+                <a:latin typeface="Posterama" panose="020B0504020200020000" pitchFamily="34" charset="0"/>
+                <a:cs typeface="Posterama" panose="020B0504020200020000" pitchFamily="34" charset="0"/>
+              </a:rPr>
               <a:t>work</a:t>
             </a:r>
             <a:r>
-              <a:rPr lang="en-GB" sz="1600" b="1" u="sng" dirty="0"/>
+              <a:rPr lang="en-GB" sz="2400" b="1" u="sng" dirty="0">
+                <a:latin typeface="Posterama" panose="020B0504020200020000" pitchFamily="34" charset="0"/>
+                <a:cs typeface="Posterama" panose="020B0504020200020000" pitchFamily="34" charset="0"/>
+              </a:rPr>
               <a:t>ed</a:t>
             </a:r>
           </a:p>
@@ -6841,8 +6941,8 @@
         </p:nvSpPr>
         <p:spPr>
           <a:xfrm>
-            <a:off x="8342135" y="5287088"/>
-            <a:ext cx="732188" cy="246221"/>
+            <a:off x="8039778" y="5225533"/>
+            <a:ext cx="1336904" cy="369332"/>
           </a:xfrm>
           <a:prstGeom prst="rect">
             <a:avLst/>
@@ -6857,11 +6957,17 @@
           <a:p>
             <a:pPr algn="ctr" rtl="0"/>
             <a:r>
-              <a:rPr lang="en-GB" sz="1600" b="1" dirty="0"/>
+              <a:rPr lang="en-GB" sz="2400" b="1" dirty="0">
+                <a:latin typeface="Posterama" panose="020B0504020200020000" pitchFamily="34" charset="0"/>
+                <a:cs typeface="Posterama" panose="020B0504020200020000" pitchFamily="34" charset="0"/>
+              </a:rPr>
               <a:t>will</a:t>
             </a:r>
             <a:r>
-              <a:rPr lang="en-GB" sz="1600" dirty="0"/>
+              <a:rPr lang="en-GB" sz="2400" dirty="0">
+                <a:latin typeface="Posterama" panose="020B0504020200020000" pitchFamily="34" charset="0"/>
+                <a:cs typeface="Posterama" panose="020B0504020200020000" pitchFamily="34" charset="0"/>
+              </a:rPr>
               <a:t> work</a:t>
             </a:r>
           </a:p>
@@ -24245,23 +24351,12 @@
 </file>
 
 <file path=customXml/item1.xml><?xml version="1.0" encoding="utf-8"?>
-<p:properties xmlns:p="http://schemas.microsoft.com/office/2006/metadata/properties" xmlns:xsi="http://www.w3.org/2001/XMLSchema-instance" xmlns:pc="http://schemas.microsoft.com/office/infopath/2007/PartnerControls">
-  <documentManagement>
-    <_ip_UnifiedCompliancePolicyUIAction xmlns="http://schemas.microsoft.com/sharepoint/v3" xsi:nil="true"/>
-    <Image xmlns="71af3243-3dd4-4a8d-8c0d-dd76da1f02a5">
-      <Url xsi:nil="true"/>
-      <Description xsi:nil="true"/>
-    </Image>
-    <Status xmlns="71af3243-3dd4-4a8d-8c0d-dd76da1f02a5">Not started</Status>
-    <Background xmlns="71af3243-3dd4-4a8d-8c0d-dd76da1f02a5">false</Background>
-    <_ip_UnifiedCompliancePolicyProperties xmlns="http://schemas.microsoft.com/sharepoint/v3" xsi:nil="true"/>
-    <ImageTagsTaxHTField xmlns="71af3243-3dd4-4a8d-8c0d-dd76da1f02a5">
-      <Terms xmlns="http://schemas.microsoft.com/office/infopath/2007/PartnerControls"/>
-    </ImageTagsTaxHTField>
-    <TaxCatchAll xmlns="230e9df3-be65-4c73-a93b-d1236ebd677e" xsi:nil="true"/>
-    <MediaServiceKeyPoints xmlns="71af3243-3dd4-4a8d-8c0d-dd76da1f02a5" xsi:nil="true"/>
-  </documentManagement>
-</p:properties>
+<?mso-contentType ?>
+<FormTemplates xmlns="http://schemas.microsoft.com/sharepoint/v3/contenttype/forms">
+  <Display>DocumentLibraryForm</Display>
+  <Edit>DocumentLibraryForm</Edit>
+  <New>DocumentLibraryForm</New>
+</FormTemplates>
 </file>
 
 <file path=customXml/item2.xml><?xml version="1.0" encoding="utf-8"?>
@@ -24553,29 +24648,29 @@
 </file>
 
 <file path=customXml/item3.xml><?xml version="1.0" encoding="utf-8"?>
-<?mso-contentType ?>
-<FormTemplates xmlns="http://schemas.microsoft.com/sharepoint/v3/contenttype/forms">
-  <Display>DocumentLibraryForm</Display>
-  <Edit>DocumentLibraryForm</Edit>
-  <New>DocumentLibraryForm</New>
-</FormTemplates>
+<p:properties xmlns:p="http://schemas.microsoft.com/office/2006/metadata/properties" xmlns:xsi="http://www.w3.org/2001/XMLSchema-instance" xmlns:pc="http://schemas.microsoft.com/office/infopath/2007/PartnerControls">
+  <documentManagement>
+    <_ip_UnifiedCompliancePolicyUIAction xmlns="http://schemas.microsoft.com/sharepoint/v3" xsi:nil="true"/>
+    <Image xmlns="71af3243-3dd4-4a8d-8c0d-dd76da1f02a5">
+      <Url xsi:nil="true"/>
+      <Description xsi:nil="true"/>
+    </Image>
+    <Status xmlns="71af3243-3dd4-4a8d-8c0d-dd76da1f02a5">Not started</Status>
+    <Background xmlns="71af3243-3dd4-4a8d-8c0d-dd76da1f02a5">false</Background>
+    <_ip_UnifiedCompliancePolicyProperties xmlns="http://schemas.microsoft.com/sharepoint/v3" xsi:nil="true"/>
+    <ImageTagsTaxHTField xmlns="71af3243-3dd4-4a8d-8c0d-dd76da1f02a5">
+      <Terms xmlns="http://schemas.microsoft.com/office/infopath/2007/PartnerControls"/>
+    </ImageTagsTaxHTField>
+    <TaxCatchAll xmlns="230e9df3-be65-4c73-a93b-d1236ebd677e" xsi:nil="true"/>
+    <MediaServiceKeyPoints xmlns="71af3243-3dd4-4a8d-8c0d-dd76da1f02a5" xsi:nil="true"/>
+  </documentManagement>
+</p:properties>
 </file>
 
 <file path=customXml/itemProps1.xml><?xml version="1.0" encoding="utf-8"?>
-<ds:datastoreItem xmlns:ds="http://schemas.openxmlformats.org/officeDocument/2006/customXml" ds:itemID="{1024ABD0-81DD-4E89-ADBD-FD03EEA4B679}">
+<ds:datastoreItem xmlns:ds="http://schemas.openxmlformats.org/officeDocument/2006/customXml" ds:itemID="{3AD23832-4FF3-481A-BF21-E685DF749377}">
   <ds:schemaRefs>
-    <ds:schemaRef ds:uri="http://schemas.openxmlformats.org/package/2006/metadata/core-properties"/>
-    <ds:schemaRef ds:uri="http://www.w3.org/XML/1998/namespace"/>
-    <ds:schemaRef ds:uri="16c05727-aa75-4e4a-9b5f-8a80a1165891"/>
-    <ds:schemaRef ds:uri="http://purl.org/dc/elements/1.1/"/>
-    <ds:schemaRef ds:uri="http://purl.org/dc/dcmitype/"/>
-    <ds:schemaRef ds:uri="http://schemas.microsoft.com/office/infopath/2007/PartnerControls"/>
-    <ds:schemaRef ds:uri="230e9df3-be65-4c73-a93b-d1236ebd677e"/>
-    <ds:schemaRef ds:uri="71af3243-3dd4-4a8d-8c0d-dd76da1f02a5"/>
-    <ds:schemaRef ds:uri="http://schemas.microsoft.com/office/2006/documentManagement/types"/>
-    <ds:schemaRef ds:uri="http://schemas.microsoft.com/sharepoint/v3"/>
-    <ds:schemaRef ds:uri="http://schemas.microsoft.com/office/2006/metadata/properties"/>
-    <ds:schemaRef ds:uri="http://purl.org/dc/terms/"/>
+    <ds:schemaRef ds:uri="http://schemas.microsoft.com/sharepoint/v3/contenttype/forms"/>
   </ds:schemaRefs>
 </ds:datastoreItem>
 </file>
@@ -24602,9 +24697,20 @@
 </file>
 
 <file path=customXml/itemProps3.xml><?xml version="1.0" encoding="utf-8"?>
-<ds:datastoreItem xmlns:ds="http://schemas.openxmlformats.org/officeDocument/2006/customXml" ds:itemID="{3AD23832-4FF3-481A-BF21-E685DF749377}">
+<ds:datastoreItem xmlns:ds="http://schemas.openxmlformats.org/officeDocument/2006/customXml" ds:itemID="{1024ABD0-81DD-4E89-ADBD-FD03EEA4B679}">
   <ds:schemaRefs>
-    <ds:schemaRef ds:uri="http://schemas.microsoft.com/sharepoint/v3/contenttype/forms"/>
+    <ds:schemaRef ds:uri="http://schemas.openxmlformats.org/package/2006/metadata/core-properties"/>
+    <ds:schemaRef ds:uri="http://www.w3.org/XML/1998/namespace"/>
+    <ds:schemaRef ds:uri="16c05727-aa75-4e4a-9b5f-8a80a1165891"/>
+    <ds:schemaRef ds:uri="http://purl.org/dc/elements/1.1/"/>
+    <ds:schemaRef ds:uri="http://purl.org/dc/dcmitype/"/>
+    <ds:schemaRef ds:uri="http://schemas.microsoft.com/office/infopath/2007/PartnerControls"/>
+    <ds:schemaRef ds:uri="230e9df3-be65-4c73-a93b-d1236ebd677e"/>
+    <ds:schemaRef ds:uri="71af3243-3dd4-4a8d-8c0d-dd76da1f02a5"/>
+    <ds:schemaRef ds:uri="http://schemas.microsoft.com/office/2006/documentManagement/types"/>
+    <ds:schemaRef ds:uri="http://schemas.microsoft.com/sharepoint/v3"/>
+    <ds:schemaRef ds:uri="http://schemas.microsoft.com/office/2006/metadata/properties"/>
+    <ds:schemaRef ds:uri="http://purl.org/dc/terms/"/>
   </ds:schemaRefs>
 </ds:datastoreItem>
 </file>
</xml_diff>

<commit_message>
grammar rules for lesson 24 done
</commit_message>
<xml_diff>
--- a/public/docs/Reviews.pptx
+++ b/public/docs/Reviews.pptx
@@ -5393,8 +5393,8 @@
         </p:nvSpPr>
         <p:spPr>
           <a:xfrm>
-            <a:off x="3760737" y="1543281"/>
-            <a:ext cx="1389804" cy="369332"/>
+            <a:off x="3646122" y="1512504"/>
+            <a:ext cx="1619034" cy="430887"/>
           </a:xfrm>
           <a:prstGeom prst="rect">
             <a:avLst/>
@@ -5409,7 +5409,7 @@
           <a:p>
             <a:pPr algn="ctr" rtl="0"/>
             <a:r>
-              <a:rPr lang="en-GB" sz="2400" b="1" dirty="0">
+              <a:rPr lang="en-GB" sz="2800" b="1" dirty="0">
                 <a:latin typeface="Posterama" panose="020B0504020200020000" pitchFamily="34" charset="0"/>
                 <a:cs typeface="Posterama" panose="020B0504020200020000" pitchFamily="34" charset="0"/>
               </a:rPr>
@@ -5432,8 +5432,8 @@
         </p:nvSpPr>
         <p:spPr>
           <a:xfrm>
-            <a:off x="6179581" y="1543281"/>
-            <a:ext cx="804707" cy="369332"/>
+            <a:off x="6113857" y="1512504"/>
+            <a:ext cx="936155" cy="430887"/>
           </a:xfrm>
           <a:prstGeom prst="rect">
             <a:avLst/>
@@ -5448,7 +5448,7 @@
           <a:p>
             <a:pPr algn="ctr" rtl="0"/>
             <a:r>
-              <a:rPr lang="en-GB" sz="2400" b="1" dirty="0">
+              <a:rPr lang="en-GB" sz="2800" b="1" dirty="0">
                 <a:latin typeface="Posterama" panose="020B0504020200020000" pitchFamily="34" charset="0"/>
                 <a:cs typeface="Posterama" panose="020B0504020200020000" pitchFamily="34" charset="0"/>
               </a:rPr>
@@ -5471,8 +5471,8 @@
         </p:nvSpPr>
         <p:spPr>
           <a:xfrm>
-            <a:off x="8091073" y="1543281"/>
-            <a:ext cx="1234313" cy="369332"/>
+            <a:off x="7987680" y="1512504"/>
+            <a:ext cx="1441100" cy="430887"/>
           </a:xfrm>
           <a:prstGeom prst="rect">
             <a:avLst/>
@@ -5487,7 +5487,7 @@
           <a:p>
             <a:pPr algn="ctr" rtl="0"/>
             <a:r>
-              <a:rPr lang="en-GB" sz="2400" b="1" dirty="0">
+              <a:rPr lang="en-GB" sz="2800" b="1" dirty="0">
                 <a:latin typeface="Posterama" panose="020B0504020200020000" pitchFamily="34" charset="0"/>
                 <a:cs typeface="Posterama" panose="020B0504020200020000" pitchFamily="34" charset="0"/>
               </a:rPr>
@@ -6325,8 +6325,8 @@
         </p:nvSpPr>
         <p:spPr>
           <a:xfrm>
-            <a:off x="4097367" y="2266321"/>
-            <a:ext cx="716543" cy="369332"/>
+            <a:off x="4037254" y="2235544"/>
+            <a:ext cx="836769" cy="430887"/>
           </a:xfrm>
           <a:prstGeom prst="rect">
             <a:avLst/>
@@ -6341,7 +6341,7 @@
           <a:p>
             <a:pPr algn="ctr" rtl="0"/>
             <a:r>
-              <a:rPr lang="en-GB" sz="2400" dirty="0">
+              <a:rPr lang="en-GB" sz="2800" dirty="0">
                 <a:latin typeface="Posterama" panose="020B0504020200020000" pitchFamily="34" charset="0"/>
                 <a:cs typeface="Posterama" panose="020B0504020200020000" pitchFamily="34" charset="0"/>
               </a:rPr>
@@ -6364,8 +6364,8 @@
         </p:nvSpPr>
         <p:spPr>
           <a:xfrm>
-            <a:off x="6044127" y="2266321"/>
-            <a:ext cx="1075615" cy="369332"/>
+            <a:off x="5953557" y="2235544"/>
+            <a:ext cx="1256755" cy="430887"/>
           </a:xfrm>
           <a:prstGeom prst="rect">
             <a:avLst/>
@@ -6380,14 +6380,14 @@
           <a:p>
             <a:pPr algn="ctr" rtl="0"/>
             <a:r>
-              <a:rPr lang="en-GB" sz="2400" dirty="0">
+              <a:rPr lang="en-GB" sz="2800" dirty="0">
                 <a:latin typeface="Posterama" panose="020B0504020200020000" pitchFamily="34" charset="0"/>
                 <a:cs typeface="Posterama" panose="020B0504020200020000" pitchFamily="34" charset="0"/>
               </a:rPr>
               <a:t>work</a:t>
             </a:r>
             <a:r>
-              <a:rPr lang="en-GB" sz="2400" b="1" u="sng" dirty="0">
+              <a:rPr lang="en-GB" sz="2800" b="1" u="sng" dirty="0">
                 <a:latin typeface="Posterama" panose="020B0504020200020000" pitchFamily="34" charset="0"/>
                 <a:cs typeface="Posterama" panose="020B0504020200020000" pitchFamily="34" charset="0"/>
               </a:rPr>
@@ -6410,8 +6410,8 @@
         </p:nvSpPr>
         <p:spPr>
           <a:xfrm>
-            <a:off x="8039778" y="2266321"/>
-            <a:ext cx="1336904" cy="369332"/>
+            <a:off x="7926766" y="2235544"/>
+            <a:ext cx="1562928" cy="430887"/>
           </a:xfrm>
           <a:prstGeom prst="rect">
             <a:avLst/>
@@ -6426,14 +6426,14 @@
           <a:p>
             <a:pPr algn="ctr" rtl="0"/>
             <a:r>
-              <a:rPr lang="en-GB" sz="2400" b="1" dirty="0">
+              <a:rPr lang="en-GB" sz="2800" b="1" dirty="0">
                 <a:latin typeface="Posterama" panose="020B0504020200020000" pitchFamily="34" charset="0"/>
                 <a:cs typeface="Posterama" panose="020B0504020200020000" pitchFamily="34" charset="0"/>
               </a:rPr>
               <a:t>will</a:t>
             </a:r>
             <a:r>
-              <a:rPr lang="en-GB" sz="2400" dirty="0">
+              <a:rPr lang="en-GB" sz="2800" dirty="0">
                 <a:latin typeface="Posterama" panose="020B0504020200020000" pitchFamily="34" charset="0"/>
                 <a:cs typeface="Posterama" panose="020B0504020200020000" pitchFamily="34" charset="0"/>
               </a:rPr>
@@ -6456,8 +6456,8 @@
         </p:nvSpPr>
         <p:spPr>
           <a:xfrm>
-            <a:off x="4097367" y="2976142"/>
-            <a:ext cx="716543" cy="369332"/>
+            <a:off x="4037254" y="2945365"/>
+            <a:ext cx="836769" cy="430887"/>
           </a:xfrm>
           <a:prstGeom prst="rect">
             <a:avLst/>
@@ -6472,7 +6472,7 @@
           <a:p>
             <a:pPr algn="ctr" rtl="0"/>
             <a:r>
-              <a:rPr lang="en-GB" sz="2400" dirty="0">
+              <a:rPr lang="en-GB" sz="2800" dirty="0">
                 <a:latin typeface="Posterama" panose="020B0504020200020000" pitchFamily="34" charset="0"/>
                 <a:cs typeface="Posterama" panose="020B0504020200020000" pitchFamily="34" charset="0"/>
               </a:rPr>
@@ -6495,8 +6495,8 @@
         </p:nvSpPr>
         <p:spPr>
           <a:xfrm>
-            <a:off x="6044127" y="2976142"/>
-            <a:ext cx="1075615" cy="369332"/>
+            <a:off x="5953557" y="2945365"/>
+            <a:ext cx="1256755" cy="430887"/>
           </a:xfrm>
           <a:prstGeom prst="rect">
             <a:avLst/>
@@ -6511,14 +6511,14 @@
           <a:p>
             <a:pPr algn="ctr" rtl="0"/>
             <a:r>
-              <a:rPr lang="en-GB" sz="2400" dirty="0">
+              <a:rPr lang="en-GB" sz="2800" dirty="0">
                 <a:latin typeface="Posterama" panose="020B0504020200020000" pitchFamily="34" charset="0"/>
                 <a:cs typeface="Posterama" panose="020B0504020200020000" pitchFamily="34" charset="0"/>
               </a:rPr>
               <a:t>work</a:t>
             </a:r>
             <a:r>
-              <a:rPr lang="en-GB" sz="2400" b="1" u="sng" dirty="0">
+              <a:rPr lang="en-GB" sz="2800" b="1" u="sng" dirty="0">
                 <a:latin typeface="Posterama" panose="020B0504020200020000" pitchFamily="34" charset="0"/>
                 <a:cs typeface="Posterama" panose="020B0504020200020000" pitchFamily="34" charset="0"/>
               </a:rPr>
@@ -6541,8 +6541,8 @@
         </p:nvSpPr>
         <p:spPr>
           <a:xfrm>
-            <a:off x="8039778" y="2976142"/>
-            <a:ext cx="1336904" cy="369332"/>
+            <a:off x="7926766" y="2945365"/>
+            <a:ext cx="1562928" cy="430887"/>
           </a:xfrm>
           <a:prstGeom prst="rect">
             <a:avLst/>
@@ -6557,14 +6557,14 @@
           <a:p>
             <a:pPr algn="ctr" rtl="0"/>
             <a:r>
-              <a:rPr lang="en-GB" sz="2400" b="1" dirty="0">
+              <a:rPr lang="en-GB" sz="2800" b="1" dirty="0">
                 <a:latin typeface="Posterama" panose="020B0504020200020000" pitchFamily="34" charset="0"/>
                 <a:cs typeface="Posterama" panose="020B0504020200020000" pitchFamily="34" charset="0"/>
               </a:rPr>
               <a:t>will</a:t>
             </a:r>
             <a:r>
-              <a:rPr lang="en-GB" sz="2400" dirty="0">
+              <a:rPr lang="en-GB" sz="2800" dirty="0">
                 <a:latin typeface="Posterama" panose="020B0504020200020000" pitchFamily="34" charset="0"/>
                 <a:cs typeface="Posterama" panose="020B0504020200020000" pitchFamily="34" charset="0"/>
               </a:rPr>
@@ -6587,8 +6587,8 @@
         </p:nvSpPr>
         <p:spPr>
           <a:xfrm>
-            <a:off x="4022026" y="3712400"/>
-            <a:ext cx="867225" cy="369332"/>
+            <a:off x="3949089" y="3681623"/>
+            <a:ext cx="1013099" cy="430887"/>
           </a:xfrm>
           <a:prstGeom prst="rect">
             <a:avLst/>
@@ -6603,14 +6603,14 @@
           <a:p>
             <a:pPr algn="ctr" rtl="0"/>
             <a:r>
-              <a:rPr lang="en-GB" sz="2400" dirty="0">
+              <a:rPr lang="en-GB" sz="2800" dirty="0">
                 <a:latin typeface="Posterama" panose="020B0504020200020000" pitchFamily="34" charset="0"/>
                 <a:cs typeface="Posterama" panose="020B0504020200020000" pitchFamily="34" charset="0"/>
               </a:rPr>
               <a:t>work</a:t>
             </a:r>
             <a:r>
-              <a:rPr lang="en-GB" sz="2400" b="1" u="sng" dirty="0">
+              <a:rPr lang="en-GB" sz="2800" b="1" u="sng" dirty="0">
                 <a:latin typeface="Posterama" panose="020B0504020200020000" pitchFamily="34" charset="0"/>
                 <a:cs typeface="Posterama" panose="020B0504020200020000" pitchFamily="34" charset="0"/>
               </a:rPr>
@@ -6633,8 +6633,8 @@
         </p:nvSpPr>
         <p:spPr>
           <a:xfrm>
-            <a:off x="6044127" y="3712400"/>
-            <a:ext cx="1075615" cy="369332"/>
+            <a:off x="5953557" y="3681623"/>
+            <a:ext cx="1256755" cy="430887"/>
           </a:xfrm>
           <a:prstGeom prst="rect">
             <a:avLst/>
@@ -6649,14 +6649,14 @@
           <a:p>
             <a:pPr algn="ctr" rtl="0"/>
             <a:r>
-              <a:rPr lang="en-GB" sz="2400" dirty="0">
+              <a:rPr lang="en-GB" sz="2800" dirty="0">
                 <a:latin typeface="Posterama" panose="020B0504020200020000" pitchFamily="34" charset="0"/>
                 <a:cs typeface="Posterama" panose="020B0504020200020000" pitchFamily="34" charset="0"/>
               </a:rPr>
               <a:t>work</a:t>
             </a:r>
             <a:r>
-              <a:rPr lang="en-GB" sz="2400" b="1" u="sng" dirty="0">
+              <a:rPr lang="en-GB" sz="2800" b="1" u="sng" dirty="0">
                 <a:latin typeface="Posterama" panose="020B0504020200020000" pitchFamily="34" charset="0"/>
                 <a:cs typeface="Posterama" panose="020B0504020200020000" pitchFamily="34" charset="0"/>
               </a:rPr>
@@ -6679,8 +6679,8 @@
         </p:nvSpPr>
         <p:spPr>
           <a:xfrm>
-            <a:off x="8039778" y="3712400"/>
-            <a:ext cx="1336904" cy="369332"/>
+            <a:off x="7926766" y="3681623"/>
+            <a:ext cx="1562928" cy="430887"/>
           </a:xfrm>
           <a:prstGeom prst="rect">
             <a:avLst/>
@@ -6695,14 +6695,14 @@
           <a:p>
             <a:pPr algn="ctr" rtl="0"/>
             <a:r>
-              <a:rPr lang="en-GB" sz="2400" b="1" dirty="0">
+              <a:rPr lang="en-GB" sz="2800" b="1" dirty="0">
                 <a:latin typeface="Posterama" panose="020B0504020200020000" pitchFamily="34" charset="0"/>
                 <a:cs typeface="Posterama" panose="020B0504020200020000" pitchFamily="34" charset="0"/>
               </a:rPr>
               <a:t>will</a:t>
             </a:r>
             <a:r>
-              <a:rPr lang="en-GB" sz="2400" dirty="0">
+              <a:rPr lang="en-GB" sz="2800" dirty="0">
                 <a:latin typeface="Posterama" panose="020B0504020200020000" pitchFamily="34" charset="0"/>
                 <a:cs typeface="Posterama" panose="020B0504020200020000" pitchFamily="34" charset="0"/>
               </a:rPr>
@@ -6725,8 +6725,8 @@
         </p:nvSpPr>
         <p:spPr>
           <a:xfrm>
-            <a:off x="4097367" y="4432241"/>
-            <a:ext cx="716543" cy="369332"/>
+            <a:off x="4037254" y="4401464"/>
+            <a:ext cx="836769" cy="430887"/>
           </a:xfrm>
           <a:prstGeom prst="rect">
             <a:avLst/>
@@ -6741,7 +6741,7 @@
           <a:p>
             <a:pPr algn="ctr" rtl="0"/>
             <a:r>
-              <a:rPr lang="en-GB" sz="2400" dirty="0">
+              <a:rPr lang="en-GB" sz="2800" dirty="0">
                 <a:latin typeface="Posterama" panose="020B0504020200020000" pitchFamily="34" charset="0"/>
                 <a:cs typeface="Posterama" panose="020B0504020200020000" pitchFamily="34" charset="0"/>
               </a:rPr>
@@ -6764,8 +6764,8 @@
         </p:nvSpPr>
         <p:spPr>
           <a:xfrm>
-            <a:off x="6044127" y="4432241"/>
-            <a:ext cx="1075615" cy="369332"/>
+            <a:off x="5953557" y="4401464"/>
+            <a:ext cx="1256755" cy="430887"/>
           </a:xfrm>
           <a:prstGeom prst="rect">
             <a:avLst/>
@@ -6780,14 +6780,14 @@
           <a:p>
             <a:pPr algn="ctr" rtl="0"/>
             <a:r>
-              <a:rPr lang="en-GB" sz="2400" dirty="0">
+              <a:rPr lang="en-GB" sz="2800" dirty="0">
                 <a:latin typeface="Posterama" panose="020B0504020200020000" pitchFamily="34" charset="0"/>
                 <a:cs typeface="Posterama" panose="020B0504020200020000" pitchFamily="34" charset="0"/>
               </a:rPr>
               <a:t>work</a:t>
             </a:r>
             <a:r>
-              <a:rPr lang="en-GB" sz="2400" b="1" u="sng" dirty="0">
+              <a:rPr lang="en-GB" sz="2800" b="1" u="sng" dirty="0">
                 <a:latin typeface="Posterama" panose="020B0504020200020000" pitchFamily="34" charset="0"/>
                 <a:cs typeface="Posterama" panose="020B0504020200020000" pitchFamily="34" charset="0"/>
               </a:rPr>
@@ -6810,8 +6810,8 @@
         </p:nvSpPr>
         <p:spPr>
           <a:xfrm>
-            <a:off x="8039778" y="4432241"/>
-            <a:ext cx="1336904" cy="369332"/>
+            <a:off x="7926766" y="4401464"/>
+            <a:ext cx="1562928" cy="430887"/>
           </a:xfrm>
           <a:prstGeom prst="rect">
             <a:avLst/>
@@ -6826,14 +6826,14 @@
           <a:p>
             <a:pPr algn="ctr" rtl="0"/>
             <a:r>
-              <a:rPr lang="en-GB" sz="2400" b="1" dirty="0">
+              <a:rPr lang="en-GB" sz="2800" b="1" dirty="0">
                 <a:latin typeface="Posterama" panose="020B0504020200020000" pitchFamily="34" charset="0"/>
                 <a:cs typeface="Posterama" panose="020B0504020200020000" pitchFamily="34" charset="0"/>
               </a:rPr>
               <a:t>will</a:t>
             </a:r>
             <a:r>
-              <a:rPr lang="en-GB" sz="2400" dirty="0">
+              <a:rPr lang="en-GB" sz="2800" dirty="0">
                 <a:latin typeface="Posterama" panose="020B0504020200020000" pitchFamily="34" charset="0"/>
                 <a:cs typeface="Posterama" panose="020B0504020200020000" pitchFamily="34" charset="0"/>
               </a:rPr>
@@ -6856,8 +6856,8 @@
         </p:nvSpPr>
         <p:spPr>
           <a:xfrm>
-            <a:off x="4097367" y="5225533"/>
-            <a:ext cx="716543" cy="369332"/>
+            <a:off x="4037254" y="5194756"/>
+            <a:ext cx="836769" cy="430887"/>
           </a:xfrm>
           <a:prstGeom prst="rect">
             <a:avLst/>
@@ -6872,7 +6872,7 @@
           <a:p>
             <a:pPr algn="ctr" rtl="0"/>
             <a:r>
-              <a:rPr lang="en-GB" sz="2400" dirty="0">
+              <a:rPr lang="en-GB" sz="2800" dirty="0">
                 <a:latin typeface="Posterama" panose="020B0504020200020000" pitchFamily="34" charset="0"/>
                 <a:cs typeface="Posterama" panose="020B0504020200020000" pitchFamily="34" charset="0"/>
               </a:rPr>
@@ -6895,8 +6895,8 @@
         </p:nvSpPr>
         <p:spPr>
           <a:xfrm>
-            <a:off x="6044127" y="5225533"/>
-            <a:ext cx="1075615" cy="369332"/>
+            <a:off x="5953557" y="5194756"/>
+            <a:ext cx="1256755" cy="430887"/>
           </a:xfrm>
           <a:prstGeom prst="rect">
             <a:avLst/>
@@ -6911,14 +6911,14 @@
           <a:p>
             <a:pPr algn="ctr" rtl="0"/>
             <a:r>
-              <a:rPr lang="en-GB" sz="2400" dirty="0">
+              <a:rPr lang="en-GB" sz="2800" dirty="0">
                 <a:latin typeface="Posterama" panose="020B0504020200020000" pitchFamily="34" charset="0"/>
                 <a:cs typeface="Posterama" panose="020B0504020200020000" pitchFamily="34" charset="0"/>
               </a:rPr>
               <a:t>work</a:t>
             </a:r>
             <a:r>
-              <a:rPr lang="en-GB" sz="2400" b="1" u="sng" dirty="0">
+              <a:rPr lang="en-GB" sz="2800" b="1" u="sng" dirty="0">
                 <a:latin typeface="Posterama" panose="020B0504020200020000" pitchFamily="34" charset="0"/>
                 <a:cs typeface="Posterama" panose="020B0504020200020000" pitchFamily="34" charset="0"/>
               </a:rPr>
@@ -6941,8 +6941,8 @@
         </p:nvSpPr>
         <p:spPr>
           <a:xfrm>
-            <a:off x="8039778" y="5225533"/>
-            <a:ext cx="1336904" cy="369332"/>
+            <a:off x="7926766" y="5194756"/>
+            <a:ext cx="1562928" cy="430887"/>
           </a:xfrm>
           <a:prstGeom prst="rect">
             <a:avLst/>
@@ -6957,14 +6957,14 @@
           <a:p>
             <a:pPr algn="ctr" rtl="0"/>
             <a:r>
-              <a:rPr lang="en-GB" sz="2400" b="1" dirty="0">
+              <a:rPr lang="en-GB" sz="2800" b="1" dirty="0">
                 <a:latin typeface="Posterama" panose="020B0504020200020000" pitchFamily="34" charset="0"/>
                 <a:cs typeface="Posterama" panose="020B0504020200020000" pitchFamily="34" charset="0"/>
               </a:rPr>
               <a:t>will</a:t>
             </a:r>
             <a:r>
-              <a:rPr lang="en-GB" sz="2400" dirty="0">
+              <a:rPr lang="en-GB" sz="2800" dirty="0">
                 <a:latin typeface="Posterama" panose="020B0504020200020000" pitchFamily="34" charset="0"/>
                 <a:cs typeface="Posterama" panose="020B0504020200020000" pitchFamily="34" charset="0"/>
               </a:rPr>
@@ -24351,12 +24351,23 @@
 </file>
 
 <file path=customXml/item1.xml><?xml version="1.0" encoding="utf-8"?>
-<?mso-contentType ?>
-<FormTemplates xmlns="http://schemas.microsoft.com/sharepoint/v3/contenttype/forms">
-  <Display>DocumentLibraryForm</Display>
-  <Edit>DocumentLibraryForm</Edit>
-  <New>DocumentLibraryForm</New>
-</FormTemplates>
+<p:properties xmlns:p="http://schemas.microsoft.com/office/2006/metadata/properties" xmlns:xsi="http://www.w3.org/2001/XMLSchema-instance" xmlns:pc="http://schemas.microsoft.com/office/infopath/2007/PartnerControls">
+  <documentManagement>
+    <_ip_UnifiedCompliancePolicyUIAction xmlns="http://schemas.microsoft.com/sharepoint/v3" xsi:nil="true"/>
+    <Image xmlns="71af3243-3dd4-4a8d-8c0d-dd76da1f02a5">
+      <Url xsi:nil="true"/>
+      <Description xsi:nil="true"/>
+    </Image>
+    <Status xmlns="71af3243-3dd4-4a8d-8c0d-dd76da1f02a5">Not started</Status>
+    <Background xmlns="71af3243-3dd4-4a8d-8c0d-dd76da1f02a5">false</Background>
+    <_ip_UnifiedCompliancePolicyProperties xmlns="http://schemas.microsoft.com/sharepoint/v3" xsi:nil="true"/>
+    <ImageTagsTaxHTField xmlns="71af3243-3dd4-4a8d-8c0d-dd76da1f02a5">
+      <Terms xmlns="http://schemas.microsoft.com/office/infopath/2007/PartnerControls"/>
+    </ImageTagsTaxHTField>
+    <TaxCatchAll xmlns="230e9df3-be65-4c73-a93b-d1236ebd677e" xsi:nil="true"/>
+    <MediaServiceKeyPoints xmlns="71af3243-3dd4-4a8d-8c0d-dd76da1f02a5" xsi:nil="true"/>
+  </documentManagement>
+</p:properties>
 </file>
 
 <file path=customXml/item2.xml><?xml version="1.0" encoding="utf-8"?>
@@ -24648,29 +24659,29 @@
 </file>
 
 <file path=customXml/item3.xml><?xml version="1.0" encoding="utf-8"?>
-<p:properties xmlns:p="http://schemas.microsoft.com/office/2006/metadata/properties" xmlns:xsi="http://www.w3.org/2001/XMLSchema-instance" xmlns:pc="http://schemas.microsoft.com/office/infopath/2007/PartnerControls">
-  <documentManagement>
-    <_ip_UnifiedCompliancePolicyUIAction xmlns="http://schemas.microsoft.com/sharepoint/v3" xsi:nil="true"/>
-    <Image xmlns="71af3243-3dd4-4a8d-8c0d-dd76da1f02a5">
-      <Url xsi:nil="true"/>
-      <Description xsi:nil="true"/>
-    </Image>
-    <Status xmlns="71af3243-3dd4-4a8d-8c0d-dd76da1f02a5">Not started</Status>
-    <Background xmlns="71af3243-3dd4-4a8d-8c0d-dd76da1f02a5">false</Background>
-    <_ip_UnifiedCompliancePolicyProperties xmlns="http://schemas.microsoft.com/sharepoint/v3" xsi:nil="true"/>
-    <ImageTagsTaxHTField xmlns="71af3243-3dd4-4a8d-8c0d-dd76da1f02a5">
-      <Terms xmlns="http://schemas.microsoft.com/office/infopath/2007/PartnerControls"/>
-    </ImageTagsTaxHTField>
-    <TaxCatchAll xmlns="230e9df3-be65-4c73-a93b-d1236ebd677e" xsi:nil="true"/>
-    <MediaServiceKeyPoints xmlns="71af3243-3dd4-4a8d-8c0d-dd76da1f02a5" xsi:nil="true"/>
-  </documentManagement>
-</p:properties>
+<?mso-contentType ?>
+<FormTemplates xmlns="http://schemas.microsoft.com/sharepoint/v3/contenttype/forms">
+  <Display>DocumentLibraryForm</Display>
+  <Edit>DocumentLibraryForm</Edit>
+  <New>DocumentLibraryForm</New>
+</FormTemplates>
 </file>
 
 <file path=customXml/itemProps1.xml><?xml version="1.0" encoding="utf-8"?>
-<ds:datastoreItem xmlns:ds="http://schemas.openxmlformats.org/officeDocument/2006/customXml" ds:itemID="{3AD23832-4FF3-481A-BF21-E685DF749377}">
+<ds:datastoreItem xmlns:ds="http://schemas.openxmlformats.org/officeDocument/2006/customXml" ds:itemID="{1024ABD0-81DD-4E89-ADBD-FD03EEA4B679}">
   <ds:schemaRefs>
-    <ds:schemaRef ds:uri="http://schemas.microsoft.com/sharepoint/v3/contenttype/forms"/>
+    <ds:schemaRef ds:uri="http://schemas.openxmlformats.org/package/2006/metadata/core-properties"/>
+    <ds:schemaRef ds:uri="http://www.w3.org/XML/1998/namespace"/>
+    <ds:schemaRef ds:uri="16c05727-aa75-4e4a-9b5f-8a80a1165891"/>
+    <ds:schemaRef ds:uri="http://purl.org/dc/elements/1.1/"/>
+    <ds:schemaRef ds:uri="http://purl.org/dc/dcmitype/"/>
+    <ds:schemaRef ds:uri="http://schemas.microsoft.com/office/infopath/2007/PartnerControls"/>
+    <ds:schemaRef ds:uri="230e9df3-be65-4c73-a93b-d1236ebd677e"/>
+    <ds:schemaRef ds:uri="71af3243-3dd4-4a8d-8c0d-dd76da1f02a5"/>
+    <ds:schemaRef ds:uri="http://schemas.microsoft.com/office/2006/documentManagement/types"/>
+    <ds:schemaRef ds:uri="http://schemas.microsoft.com/sharepoint/v3"/>
+    <ds:schemaRef ds:uri="http://schemas.microsoft.com/office/2006/metadata/properties"/>
+    <ds:schemaRef ds:uri="http://purl.org/dc/terms/"/>
   </ds:schemaRefs>
 </ds:datastoreItem>
 </file>
@@ -24697,20 +24708,9 @@
 </file>
 
 <file path=customXml/itemProps3.xml><?xml version="1.0" encoding="utf-8"?>
-<ds:datastoreItem xmlns:ds="http://schemas.openxmlformats.org/officeDocument/2006/customXml" ds:itemID="{1024ABD0-81DD-4E89-ADBD-FD03EEA4B679}">
+<ds:datastoreItem xmlns:ds="http://schemas.openxmlformats.org/officeDocument/2006/customXml" ds:itemID="{3AD23832-4FF3-481A-BF21-E685DF749377}">
   <ds:schemaRefs>
-    <ds:schemaRef ds:uri="http://schemas.openxmlformats.org/package/2006/metadata/core-properties"/>
-    <ds:schemaRef ds:uri="http://www.w3.org/XML/1998/namespace"/>
-    <ds:schemaRef ds:uri="16c05727-aa75-4e4a-9b5f-8a80a1165891"/>
-    <ds:schemaRef ds:uri="http://purl.org/dc/elements/1.1/"/>
-    <ds:schemaRef ds:uri="http://purl.org/dc/dcmitype/"/>
-    <ds:schemaRef ds:uri="http://schemas.microsoft.com/office/infopath/2007/PartnerControls"/>
-    <ds:schemaRef ds:uri="230e9df3-be65-4c73-a93b-d1236ebd677e"/>
-    <ds:schemaRef ds:uri="71af3243-3dd4-4a8d-8c0d-dd76da1f02a5"/>
-    <ds:schemaRef ds:uri="http://schemas.microsoft.com/office/2006/documentManagement/types"/>
-    <ds:schemaRef ds:uri="http://schemas.microsoft.com/sharepoint/v3"/>
-    <ds:schemaRef ds:uri="http://schemas.microsoft.com/office/2006/metadata/properties"/>
-    <ds:schemaRef ds:uri="http://purl.org/dc/terms/"/>
+    <ds:schemaRef ds:uri="http://schemas.microsoft.com/sharepoint/v3/contenttype/forms"/>
   </ds:schemaRefs>
 </ds:datastoreItem>
 </file>
</xml_diff>

<commit_message>
grammar rules for lesson 26 done
</commit_message>
<xml_diff>
--- a/public/docs/Reviews.pptx
+++ b/public/docs/Reviews.pptx
@@ -9192,8 +9192,8 @@
         </p:nvSpPr>
         <p:spPr>
           <a:xfrm>
-            <a:off x="3448105" y="249530"/>
-            <a:ext cx="6425718" cy="492443"/>
+            <a:off x="3857021" y="122735"/>
+            <a:ext cx="6425718" cy="677108"/>
           </a:xfrm>
           <a:prstGeom prst="rect">
             <a:avLst/>
@@ -9208,13 +9208,15 @@
           <a:p>
             <a:pPr algn="ctr" rtl="0"/>
             <a:r>
-              <a:rPr lang="en-GB" sz="3200" b="1" dirty="0">
-                <a:latin typeface="+mj-lt"/>
+              <a:rPr lang="en-GB" sz="4400" b="1" dirty="0">
+                <a:latin typeface="Posterama" panose="020B0504020200020000" pitchFamily="34" charset="0"/>
+                <a:cs typeface="Posterama" panose="020B0504020200020000" pitchFamily="34" charset="0"/>
               </a:rPr>
               <a:t>CONTINUOUS TENSE</a:t>
             </a:r>
-            <a:endParaRPr lang="en-GB" sz="3600" dirty="0">
-              <a:latin typeface="+mj-lt"/>
+            <a:endParaRPr lang="en-GB" sz="4800" dirty="0">
+              <a:latin typeface="Posterama" panose="020B0504020200020000" pitchFamily="34" charset="0"/>
+              <a:cs typeface="Posterama" panose="020B0504020200020000" pitchFamily="34" charset="0"/>
             </a:endParaRPr>
           </a:p>
         </p:txBody>
@@ -9233,8 +9235,8 @@
         </p:nvSpPr>
         <p:spPr>
           <a:xfrm>
-            <a:off x="3493308" y="763422"/>
-            <a:ext cx="6425717" cy="307777"/>
+            <a:off x="3612505" y="754490"/>
+            <a:ext cx="7068312" cy="369332"/>
           </a:xfrm>
           <a:prstGeom prst="rect">
             <a:avLst/>
@@ -9249,18 +9251,30 @@
           <a:p>
             <a:pPr algn="ctr" rtl="0"/>
             <a:r>
-              <a:rPr lang="uk-UA" sz="2000" dirty="0"/>
+              <a:rPr lang="uk-UA" sz="2400" dirty="0">
+                <a:latin typeface="Posterama" panose="020B0504020200020000" pitchFamily="34" charset="0"/>
+                <a:cs typeface="Posterama" panose="020B0504020200020000" pitchFamily="34" charset="0"/>
+              </a:rPr>
               <a:t>Показує, що</a:t>
             </a:r>
             <a:r>
-              <a:rPr lang="ru-RU" sz="2000" dirty="0"/>
+              <a:rPr lang="ru-RU" sz="2400" dirty="0">
+                <a:latin typeface="Posterama" panose="020B0504020200020000" pitchFamily="34" charset="0"/>
+                <a:cs typeface="Posterama" panose="020B0504020200020000" pitchFamily="34" charset="0"/>
+              </a:rPr>
               <a:t> </a:t>
             </a:r>
             <a:r>
-              <a:rPr lang="ru-RU" sz="2000" b="1" dirty="0"/>
+              <a:rPr lang="ru-RU" sz="2400" b="1" dirty="0">
+                <a:latin typeface="Posterama" panose="020B0504020200020000" pitchFamily="34" charset="0"/>
+                <a:cs typeface="Posterama" panose="020B0504020200020000" pitchFamily="34" charset="0"/>
+              </a:rPr>
               <a:t>дія триває у певний момент часу</a:t>
             </a:r>
-            <a:endParaRPr lang="en-GB" sz="2000" b="1" dirty="0"/>
+            <a:endParaRPr lang="en-GB" sz="2400" b="1" dirty="0">
+              <a:latin typeface="Posterama" panose="020B0504020200020000" pitchFamily="34" charset="0"/>
+              <a:cs typeface="Posterama" panose="020B0504020200020000" pitchFamily="34" charset="0"/>
+            </a:endParaRPr>
           </a:p>
         </p:txBody>
       </p:sp>
@@ -9282,17 +9296,17 @@
         <p:spPr>
           <a:xfrm>
             <a:off x="3448105" y="1447801"/>
-            <a:ext cx="6516124" cy="560290"/>
+            <a:ext cx="7341814" cy="560290"/>
           </a:xfrm>
           <a:prstGeom prst="roundRect">
             <a:avLst>
-              <a:gd name="adj" fmla="val 50000"/>
+              <a:gd name="adj" fmla="val 28784"/>
             </a:avLst>
           </a:prstGeom>
           <a:solidFill>
-            <a:schemeClr val="accent1">
+            <a:srgbClr val="66B2B0">
               <a:alpha val="55000"/>
-            </a:schemeClr>
+            </a:srgbClr>
           </a:solidFill>
           <a:ln w="9525">
             <a:noFill/>
@@ -9337,8 +9351,8 @@
         </p:nvSpPr>
         <p:spPr>
           <a:xfrm>
-            <a:off x="4095154" y="1604836"/>
-            <a:ext cx="720967" cy="246221"/>
+            <a:off x="3840188" y="1527892"/>
+            <a:ext cx="1505220" cy="400110"/>
           </a:xfrm>
           <a:prstGeom prst="rect">
             <a:avLst/>
@@ -9353,7 +9367,10 @@
           <a:p>
             <a:pPr algn="ctr" rtl="0"/>
             <a:r>
-              <a:rPr lang="en-GB" sz="1600" b="1" dirty="0"/>
+              <a:rPr lang="en-GB" sz="2600" b="1" dirty="0">
+                <a:latin typeface="Posterama" panose="020B0504020200020000" pitchFamily="34" charset="0"/>
+                <a:cs typeface="Posterama" panose="020B0504020200020000" pitchFamily="34" charset="0"/>
+              </a:rPr>
               <a:t>PRESENT</a:t>
             </a:r>
           </a:p>
@@ -9373,8 +9390,8 @@
         </p:nvSpPr>
         <p:spPr>
           <a:xfrm>
-            <a:off x="6387682" y="1604836"/>
-            <a:ext cx="388504" cy="246221"/>
+            <a:off x="6357031" y="1527892"/>
+            <a:ext cx="870431" cy="400110"/>
           </a:xfrm>
           <a:prstGeom prst="rect">
             <a:avLst/>
@@ -9389,7 +9406,10 @@
           <a:p>
             <a:pPr algn="ctr" rtl="0"/>
             <a:r>
-              <a:rPr lang="en-GB" sz="1600" b="1" dirty="0"/>
+              <a:rPr lang="en-GB" sz="2600" b="1" dirty="0">
+                <a:latin typeface="Posterama" panose="020B0504020200020000" pitchFamily="34" charset="0"/>
+                <a:cs typeface="Posterama" panose="020B0504020200020000" pitchFamily="34" charset="0"/>
+              </a:rPr>
               <a:t>PAST</a:t>
             </a:r>
           </a:p>
@@ -9409,8 +9429,8 @@
         </p:nvSpPr>
         <p:spPr>
           <a:xfrm>
-            <a:off x="8382017" y="1604836"/>
-            <a:ext cx="652423" cy="246221"/>
+            <a:off x="8944231" y="1527892"/>
+            <a:ext cx="1338508" cy="400110"/>
           </a:xfrm>
           <a:prstGeom prst="rect">
             <a:avLst/>
@@ -9425,7 +9445,10 @@
           <a:p>
             <a:pPr algn="ctr" rtl="0"/>
             <a:r>
-              <a:rPr lang="en-GB" sz="1600" b="1" dirty="0"/>
+              <a:rPr lang="en-GB" sz="2600" b="1" dirty="0">
+                <a:latin typeface="Posterama" panose="020B0504020200020000" pitchFamily="34" charset="0"/>
+                <a:cs typeface="Posterama" panose="020B0504020200020000" pitchFamily="34" charset="0"/>
+              </a:rPr>
               <a:t>FUTURE</a:t>
             </a:r>
           </a:p>
@@ -9448,20 +9471,18 @@
         </p:nvSpPr>
         <p:spPr>
           <a:xfrm>
-            <a:off x="3448105" y="2170841"/>
-            <a:ext cx="6516124" cy="560290"/>
+            <a:off x="3448104" y="2170841"/>
+            <a:ext cx="7341815" cy="560290"/>
           </a:xfrm>
           <a:prstGeom prst="roundRect">
             <a:avLst>
-              <a:gd name="adj" fmla="val 50000"/>
+              <a:gd name="adj" fmla="val 28784"/>
             </a:avLst>
           </a:prstGeom>
           <a:solidFill>
-            <a:schemeClr val="tx2">
-              <a:lumMod val="40000"/>
-              <a:lumOff val="60000"/>
+            <a:srgbClr val="C7DFDC">
               <a:alpha val="25000"/>
-            </a:schemeClr>
+            </a:srgbClr>
           </a:solidFill>
           <a:ln w="9525">
             <a:noFill/>
@@ -9514,13 +9535,13 @@
           </a:xfrm>
           <a:prstGeom prst="roundRect">
             <a:avLst>
-              <a:gd name="adj" fmla="val 50000"/>
+              <a:gd name="adj" fmla="val 25520"/>
             </a:avLst>
           </a:prstGeom>
           <a:solidFill>
-            <a:schemeClr val="accent1">
+            <a:srgbClr val="66B2B0">
               <a:alpha val="55000"/>
-            </a:schemeClr>
+            </a:srgbClr>
           </a:solidFill>
           <a:ln w="9525">
             <a:noFill/>
@@ -9565,8 +9586,8 @@
         </p:nvSpPr>
         <p:spPr>
           <a:xfrm>
-            <a:off x="1818563" y="2327876"/>
-            <a:ext cx="49693" cy="246221"/>
+            <a:off x="1793717" y="2266321"/>
+            <a:ext cx="99387" cy="369332"/>
           </a:xfrm>
           <a:prstGeom prst="rect">
             <a:avLst/>
@@ -9581,7 +9602,10 @@
           <a:p>
             <a:pPr algn="ctr" rtl="0"/>
             <a:r>
-              <a:rPr lang="en-GB" sz="1600" b="1" dirty="0"/>
+              <a:rPr lang="en-GB" sz="2400" b="1" dirty="0">
+                <a:latin typeface="Posterama" panose="020B0504020200020000" pitchFamily="34" charset="0"/>
+                <a:cs typeface="Posterama" panose="020B0504020200020000" pitchFamily="34" charset="0"/>
+              </a:rPr>
               <a:t>I</a:t>
             </a:r>
           </a:p>
@@ -9609,13 +9633,13 @@
           </a:xfrm>
           <a:prstGeom prst="roundRect">
             <a:avLst>
-              <a:gd name="adj" fmla="val 50000"/>
+              <a:gd name="adj" fmla="val 28784"/>
             </a:avLst>
           </a:prstGeom>
           <a:solidFill>
-            <a:schemeClr val="tx2">
+            <a:srgbClr val="C8DFDE">
               <a:alpha val="55000"/>
-            </a:schemeClr>
+            </a:srgbClr>
           </a:solidFill>
           <a:ln w="9525">
             <a:noFill/>
@@ -9663,20 +9687,18 @@
         </p:nvSpPr>
         <p:spPr>
           <a:xfrm>
-            <a:off x="3448105" y="2893881"/>
-            <a:ext cx="6516124" cy="560290"/>
+            <a:off x="3448104" y="2893881"/>
+            <a:ext cx="7341815" cy="560290"/>
           </a:xfrm>
           <a:prstGeom prst="roundRect">
             <a:avLst>
-              <a:gd name="adj" fmla="val 50000"/>
+              <a:gd name="adj" fmla="val 30416"/>
             </a:avLst>
           </a:prstGeom>
           <a:solidFill>
-            <a:schemeClr val="tx2">
-              <a:lumMod val="40000"/>
-              <a:lumOff val="60000"/>
+            <a:srgbClr val="C7DFDC">
               <a:alpha val="25000"/>
-            </a:schemeClr>
+            </a:srgbClr>
           </a:solidFill>
           <a:ln w="9525">
             <a:noFill/>
@@ -9721,8 +9743,8 @@
         </p:nvSpPr>
         <p:spPr>
           <a:xfrm>
-            <a:off x="1695195" y="3050915"/>
-            <a:ext cx="296428" cy="246221"/>
+            <a:off x="1551664" y="2989360"/>
+            <a:ext cx="583494" cy="369332"/>
           </a:xfrm>
           <a:prstGeom prst="rect">
             <a:avLst/>
@@ -9737,7 +9759,10 @@
           <a:p>
             <a:pPr algn="ctr" rtl="0"/>
             <a:r>
-              <a:rPr lang="en-GB" sz="1600" b="1" dirty="0"/>
+              <a:rPr lang="en-GB" sz="2400" b="1" dirty="0">
+                <a:latin typeface="Posterama" panose="020B0504020200020000" pitchFamily="34" charset="0"/>
+                <a:cs typeface="Posterama" panose="020B0504020200020000" pitchFamily="34" charset="0"/>
+              </a:rPr>
               <a:t>You</a:t>
             </a:r>
           </a:p>
@@ -9765,13 +9790,13 @@
           </a:xfrm>
           <a:prstGeom prst="roundRect">
             <a:avLst>
-              <a:gd name="adj" fmla="val 50000"/>
+              <a:gd name="adj" fmla="val 33680"/>
             </a:avLst>
           </a:prstGeom>
           <a:solidFill>
-            <a:schemeClr val="accent1">
+            <a:srgbClr val="66B2B0">
               <a:alpha val="55000"/>
-            </a:schemeClr>
+            </a:srgbClr>
           </a:solidFill>
           <a:ln w="9525">
             <a:noFill/>
@@ -9819,20 +9844,18 @@
         </p:nvSpPr>
         <p:spPr>
           <a:xfrm>
-            <a:off x="3448105" y="3616921"/>
-            <a:ext cx="6516124" cy="560290"/>
+            <a:off x="3448104" y="3616921"/>
+            <a:ext cx="7341815" cy="560290"/>
           </a:xfrm>
           <a:prstGeom prst="roundRect">
             <a:avLst>
-              <a:gd name="adj" fmla="val 50000"/>
+              <a:gd name="adj" fmla="val 25520"/>
             </a:avLst>
           </a:prstGeom>
           <a:solidFill>
-            <a:schemeClr val="tx2">
-              <a:lumMod val="40000"/>
-              <a:lumOff val="60000"/>
+            <a:srgbClr val="C7DFDC">
               <a:alpha val="25000"/>
-            </a:schemeClr>
+            </a:srgbClr>
           </a:solidFill>
           <a:ln w="9525">
             <a:noFill/>
@@ -9877,8 +9900,8 @@
         </p:nvSpPr>
         <p:spPr>
           <a:xfrm>
-            <a:off x="1452279" y="3773955"/>
-            <a:ext cx="782266" cy="246221"/>
+            <a:off x="1112444" y="3712400"/>
+            <a:ext cx="1461939" cy="369332"/>
           </a:xfrm>
           <a:prstGeom prst="rect">
             <a:avLst/>
@@ -9893,7 +9916,10 @@
           <a:p>
             <a:pPr algn="ctr" rtl="0"/>
             <a:r>
-              <a:rPr lang="en-GB" sz="1600" b="1" dirty="0"/>
+              <a:rPr lang="en-GB" sz="2400" b="1" dirty="0">
+                <a:latin typeface="Posterama" panose="020B0504020200020000" pitchFamily="34" charset="0"/>
+                <a:cs typeface="Posterama" panose="020B0504020200020000" pitchFamily="34" charset="0"/>
+              </a:rPr>
               <a:t>He/She/It</a:t>
             </a:r>
           </a:p>
@@ -9921,13 +9947,13 @@
           </a:xfrm>
           <a:prstGeom prst="roundRect">
             <a:avLst>
-              <a:gd name="adj" fmla="val 50000"/>
+              <a:gd name="adj" fmla="val 35312"/>
             </a:avLst>
           </a:prstGeom>
           <a:solidFill>
-            <a:schemeClr val="tx2">
+            <a:srgbClr val="C8DFDE">
               <a:alpha val="55000"/>
-            </a:schemeClr>
+            </a:srgbClr>
           </a:solidFill>
           <a:ln w="9525">
             <a:noFill/>
@@ -9975,20 +10001,18 @@
         </p:nvSpPr>
         <p:spPr>
           <a:xfrm>
-            <a:off x="3448105" y="4339961"/>
-            <a:ext cx="6516124" cy="560290"/>
+            <a:off x="3448104" y="4339961"/>
+            <a:ext cx="7341815" cy="560290"/>
           </a:xfrm>
           <a:prstGeom prst="roundRect">
             <a:avLst>
-              <a:gd name="adj" fmla="val 50000"/>
+              <a:gd name="adj" fmla="val 30416"/>
             </a:avLst>
           </a:prstGeom>
           <a:solidFill>
-            <a:schemeClr val="tx2">
-              <a:lumMod val="40000"/>
-              <a:lumOff val="60000"/>
+            <a:srgbClr val="C7DFDC">
               <a:alpha val="25000"/>
-            </a:schemeClr>
+            </a:srgbClr>
           </a:solidFill>
           <a:ln w="9525">
             <a:noFill/>
@@ -10033,8 +10057,8 @@
         </p:nvSpPr>
         <p:spPr>
           <a:xfrm>
-            <a:off x="1706096" y="4496995"/>
-            <a:ext cx="274627" cy="246221"/>
+            <a:off x="1606165" y="4435440"/>
+            <a:ext cx="474490" cy="369332"/>
           </a:xfrm>
           <a:prstGeom prst="rect">
             <a:avLst/>
@@ -10049,7 +10073,10 @@
           <a:p>
             <a:pPr algn="ctr" rtl="0"/>
             <a:r>
-              <a:rPr lang="en-GB" sz="1600" b="1" dirty="0"/>
+              <a:rPr lang="en-GB" sz="2400" b="1" dirty="0">
+                <a:latin typeface="Posterama" panose="020B0504020200020000" pitchFamily="34" charset="0"/>
+                <a:cs typeface="Posterama" panose="020B0504020200020000" pitchFamily="34" charset="0"/>
+              </a:rPr>
               <a:t>We</a:t>
             </a:r>
           </a:p>
@@ -10107,13 +10134,13 @@
           </a:xfrm>
           <a:prstGeom prst="roundRect">
             <a:avLst>
-              <a:gd name="adj" fmla="val 50000"/>
+              <a:gd name="adj" fmla="val 28784"/>
             </a:avLst>
           </a:prstGeom>
           <a:solidFill>
-            <a:schemeClr val="tx2">
+            <a:srgbClr val="66B2B0">
               <a:alpha val="55000"/>
-            </a:schemeClr>
+            </a:srgbClr>
           </a:solidFill>
           <a:ln w="9525">
             <a:noFill/>
@@ -10161,20 +10188,18 @@
         </p:nvSpPr>
         <p:spPr>
           <a:xfrm>
-            <a:off x="3448105" y="5130054"/>
-            <a:ext cx="6516124" cy="560290"/>
+            <a:off x="3448104" y="5130054"/>
+            <a:ext cx="7341815" cy="560290"/>
           </a:xfrm>
           <a:prstGeom prst="roundRect">
             <a:avLst>
-              <a:gd name="adj" fmla="val 50000"/>
+              <a:gd name="adj" fmla="val 32048"/>
             </a:avLst>
           </a:prstGeom>
           <a:solidFill>
-            <a:schemeClr val="tx2">
-              <a:lumMod val="40000"/>
-              <a:lumOff val="60000"/>
+            <a:srgbClr val="C7DFDC">
               <a:alpha val="25000"/>
-            </a:schemeClr>
+            </a:srgbClr>
           </a:solidFill>
           <a:ln w="9525">
             <a:noFill/>
@@ -10219,8 +10244,8 @@
         </p:nvSpPr>
         <p:spPr>
           <a:xfrm>
-            <a:off x="1645149" y="5287088"/>
-            <a:ext cx="396520" cy="246221"/>
+            <a:off x="1478727" y="5225533"/>
+            <a:ext cx="729367" cy="369332"/>
           </a:xfrm>
           <a:prstGeom prst="rect">
             <a:avLst/>
@@ -10235,7 +10260,10 @@
           <a:p>
             <a:pPr algn="ctr" rtl="0"/>
             <a:r>
-              <a:rPr lang="en-GB" sz="1600" b="1" dirty="0"/>
+              <a:rPr lang="en-GB" sz="2400" b="1" dirty="0">
+                <a:latin typeface="Posterama" panose="020B0504020200020000" pitchFamily="34" charset="0"/>
+                <a:cs typeface="Posterama" panose="020B0504020200020000" pitchFamily="34" charset="0"/>
+              </a:rPr>
               <a:t>They</a:t>
             </a:r>
           </a:p>
@@ -10255,8 +10283,8 @@
         </p:nvSpPr>
         <p:spPr>
           <a:xfrm>
-            <a:off x="3974929" y="2327876"/>
-            <a:ext cx="961417" cy="246221"/>
+            <a:off x="3551545" y="2250932"/>
+            <a:ext cx="1808187" cy="400110"/>
           </a:xfrm>
           <a:prstGeom prst="rect">
             <a:avLst/>
@@ -10271,7 +10299,10 @@
           <a:p>
             <a:pPr algn="ctr" rtl="0"/>
             <a:r>
-              <a:rPr lang="en-GB" sz="1600" dirty="0"/>
+              <a:rPr lang="en-GB" sz="2600" dirty="0">
+                <a:latin typeface="Posterama" panose="020B0504020200020000" pitchFamily="34" charset="0"/>
+                <a:cs typeface="Posterama" panose="020B0504020200020000" pitchFamily="34" charset="0"/>
+              </a:rPr>
               <a:t>am working</a:t>
             </a:r>
           </a:p>
@@ -10291,8 +10322,8 @@
         </p:nvSpPr>
         <p:spPr>
           <a:xfrm>
-            <a:off x="6150675" y="2327876"/>
-            <a:ext cx="1019831" cy="246221"/>
+            <a:off x="5759918" y="2250932"/>
+            <a:ext cx="1947649" cy="400110"/>
           </a:xfrm>
           <a:prstGeom prst="rect">
             <a:avLst/>
@@ -10307,7 +10338,10 @@
           <a:p>
             <a:pPr algn="ctr" rtl="0"/>
             <a:r>
-              <a:rPr lang="en-GB" sz="1600" dirty="0"/>
+              <a:rPr lang="en-GB" sz="2600" dirty="0">
+                <a:latin typeface="Posterama" panose="020B0504020200020000" pitchFamily="34" charset="0"/>
+                <a:cs typeface="Posterama" panose="020B0504020200020000" pitchFamily="34" charset="0"/>
+              </a:rPr>
               <a:t>was working</a:t>
             </a:r>
           </a:p>
@@ -10327,8 +10361,8 @@
         </p:nvSpPr>
         <p:spPr>
           <a:xfrm>
-            <a:off x="8198618" y="2327876"/>
-            <a:ext cx="1235531" cy="246221"/>
+            <a:off x="8248894" y="2250932"/>
+            <a:ext cx="2341988" cy="400110"/>
           </a:xfrm>
           <a:prstGeom prst="rect">
             <a:avLst/>
@@ -10343,7 +10377,10 @@
           <a:p>
             <a:pPr algn="ctr" rtl="0"/>
             <a:r>
-              <a:rPr lang="en-GB" sz="1600" dirty="0"/>
+              <a:rPr lang="en-GB" sz="2600" dirty="0">
+                <a:latin typeface="Posterama" panose="020B0504020200020000" pitchFamily="34" charset="0"/>
+                <a:cs typeface="Posterama" panose="020B0504020200020000" pitchFamily="34" charset="0"/>
+              </a:rPr>
               <a:t>will be working</a:t>
             </a:r>
           </a:p>
@@ -10363,8 +10400,8 @@
         </p:nvSpPr>
         <p:spPr>
           <a:xfrm>
-            <a:off x="3971627" y="3037697"/>
-            <a:ext cx="968022" cy="246221"/>
+            <a:off x="3538721" y="2960753"/>
+            <a:ext cx="1833835" cy="400110"/>
           </a:xfrm>
           <a:prstGeom prst="rect">
             <a:avLst/>
@@ -10379,7 +10416,10 @@
           <a:p>
             <a:pPr algn="ctr" rtl="0"/>
             <a:r>
-              <a:rPr lang="en-GB" sz="1600" dirty="0"/>
+              <a:rPr lang="en-GB" sz="2600" dirty="0">
+                <a:latin typeface="Posterama" panose="020B0504020200020000" pitchFamily="34" charset="0"/>
+                <a:cs typeface="Posterama" panose="020B0504020200020000" pitchFamily="34" charset="0"/>
+              </a:rPr>
               <a:t>are working</a:t>
             </a:r>
           </a:p>
@@ -10399,8 +10439,8 @@
         </p:nvSpPr>
         <p:spPr>
           <a:xfrm>
-            <a:off x="6103835" y="3037697"/>
-            <a:ext cx="1113511" cy="246221"/>
+            <a:off x="5671753" y="2960753"/>
+            <a:ext cx="2123979" cy="400110"/>
           </a:xfrm>
           <a:prstGeom prst="rect">
             <a:avLst/>
@@ -10415,7 +10455,10 @@
           <a:p>
             <a:pPr algn="ctr" rtl="0"/>
             <a:r>
-              <a:rPr lang="en-GB" sz="1600" dirty="0"/>
+              <a:rPr lang="en-GB" sz="2600" dirty="0">
+                <a:latin typeface="Posterama" panose="020B0504020200020000" pitchFamily="34" charset="0"/>
+                <a:cs typeface="Posterama" panose="020B0504020200020000" pitchFamily="34" charset="0"/>
+              </a:rPr>
               <a:t>were working</a:t>
             </a:r>
           </a:p>
@@ -10435,8 +10478,8 @@
         </p:nvSpPr>
         <p:spPr>
           <a:xfrm>
-            <a:off x="8198616" y="3037697"/>
-            <a:ext cx="1235531" cy="246221"/>
+            <a:off x="8248892" y="2960753"/>
+            <a:ext cx="2341988" cy="400110"/>
           </a:xfrm>
           <a:prstGeom prst="rect">
             <a:avLst/>
@@ -10451,7 +10494,10 @@
           <a:p>
             <a:pPr algn="ctr" rtl="0"/>
             <a:r>
-              <a:rPr lang="en-GB" sz="1600" dirty="0"/>
+              <a:rPr lang="en-GB" sz="2600" dirty="0">
+                <a:latin typeface="Posterama" panose="020B0504020200020000" pitchFamily="34" charset="0"/>
+                <a:cs typeface="Posterama" panose="020B0504020200020000" pitchFamily="34" charset="0"/>
+              </a:rPr>
               <a:t>will be working</a:t>
             </a:r>
           </a:p>
@@ -10471,8 +10517,8 @@
         </p:nvSpPr>
         <p:spPr>
           <a:xfrm>
-            <a:off x="4041453" y="3773955"/>
-            <a:ext cx="828368" cy="246221"/>
+            <a:off x="3664556" y="3697011"/>
+            <a:ext cx="1582164" cy="400110"/>
           </a:xfrm>
           <a:prstGeom prst="rect">
             <a:avLst/>
@@ -10487,7 +10533,10 @@
           <a:p>
             <a:pPr algn="ctr"/>
             <a:r>
-              <a:rPr lang="en-GB" sz="1600" dirty="0"/>
+              <a:rPr lang="en-GB" sz="2600" dirty="0">
+                <a:latin typeface="Posterama" panose="020B0504020200020000" pitchFamily="34" charset="0"/>
+                <a:cs typeface="Posterama" panose="020B0504020200020000" pitchFamily="34" charset="0"/>
+              </a:rPr>
               <a:t>is working</a:t>
             </a:r>
           </a:p>
@@ -10507,8 +10556,8 @@
         </p:nvSpPr>
         <p:spPr>
           <a:xfrm>
-            <a:off x="6150675" y="3773955"/>
-            <a:ext cx="1019831" cy="246221"/>
+            <a:off x="5759918" y="3697011"/>
+            <a:ext cx="1947649" cy="400110"/>
           </a:xfrm>
           <a:prstGeom prst="rect">
             <a:avLst/>
@@ -10523,7 +10572,10 @@
           <a:p>
             <a:pPr algn="ctr" rtl="0"/>
             <a:r>
-              <a:rPr lang="en-GB" sz="1600" dirty="0"/>
+              <a:rPr lang="en-GB" sz="2600" dirty="0">
+                <a:latin typeface="Posterama" panose="020B0504020200020000" pitchFamily="34" charset="0"/>
+                <a:cs typeface="Posterama" panose="020B0504020200020000" pitchFamily="34" charset="0"/>
+              </a:rPr>
               <a:t>was working</a:t>
             </a:r>
           </a:p>
@@ -10543,8 +10595,8 @@
         </p:nvSpPr>
         <p:spPr>
           <a:xfrm>
-            <a:off x="8198616" y="3773955"/>
-            <a:ext cx="1235531" cy="246221"/>
+            <a:off x="8248892" y="3697011"/>
+            <a:ext cx="2341988" cy="400110"/>
           </a:xfrm>
           <a:prstGeom prst="rect">
             <a:avLst/>
@@ -10559,7 +10611,10 @@
           <a:p>
             <a:pPr algn="ctr" rtl="0"/>
             <a:r>
-              <a:rPr lang="en-GB" sz="1600" dirty="0"/>
+              <a:rPr lang="en-GB" sz="2600" dirty="0">
+                <a:latin typeface="Posterama" panose="020B0504020200020000" pitchFamily="34" charset="0"/>
+                <a:cs typeface="Posterama" panose="020B0504020200020000" pitchFamily="34" charset="0"/>
+              </a:rPr>
               <a:t>will be working</a:t>
             </a:r>
           </a:p>
@@ -10579,8 +10634,8 @@
         </p:nvSpPr>
         <p:spPr>
           <a:xfrm>
-            <a:off x="3971626" y="4493796"/>
-            <a:ext cx="968022" cy="246221"/>
+            <a:off x="3538720" y="4416852"/>
+            <a:ext cx="1833835" cy="400110"/>
           </a:xfrm>
           <a:prstGeom prst="rect">
             <a:avLst/>
@@ -10595,7 +10650,10 @@
           <a:p>
             <a:pPr algn="ctr"/>
             <a:r>
-              <a:rPr lang="en-GB" sz="1600" dirty="0"/>
+              <a:rPr lang="en-GB" sz="2600" dirty="0">
+                <a:latin typeface="Posterama" panose="020B0504020200020000" pitchFamily="34" charset="0"/>
+                <a:cs typeface="Posterama" panose="020B0504020200020000" pitchFamily="34" charset="0"/>
+              </a:rPr>
               <a:t>are working</a:t>
             </a:r>
           </a:p>
@@ -10615,8 +10673,8 @@
         </p:nvSpPr>
         <p:spPr>
           <a:xfrm>
-            <a:off x="6103835" y="4493796"/>
-            <a:ext cx="1113511" cy="246221"/>
+            <a:off x="5671753" y="4416852"/>
+            <a:ext cx="2123979" cy="400110"/>
           </a:xfrm>
           <a:prstGeom prst="rect">
             <a:avLst/>
@@ -10631,7 +10689,10 @@
           <a:p>
             <a:pPr algn="ctr"/>
             <a:r>
-              <a:rPr lang="en-GB" sz="1600" dirty="0"/>
+              <a:rPr lang="en-GB" sz="2600" dirty="0">
+                <a:latin typeface="Posterama" panose="020B0504020200020000" pitchFamily="34" charset="0"/>
+                <a:cs typeface="Posterama" panose="020B0504020200020000" pitchFamily="34" charset="0"/>
+              </a:rPr>
               <a:t>were working</a:t>
             </a:r>
           </a:p>
@@ -10651,8 +10712,8 @@
         </p:nvSpPr>
         <p:spPr>
           <a:xfrm>
-            <a:off x="8198616" y="4493796"/>
-            <a:ext cx="1235531" cy="246221"/>
+            <a:off x="8248892" y="4416852"/>
+            <a:ext cx="2341988" cy="400110"/>
           </a:xfrm>
           <a:prstGeom prst="rect">
             <a:avLst/>
@@ -10667,7 +10728,10 @@
           <a:p>
             <a:pPr algn="ctr" rtl="0"/>
             <a:r>
-              <a:rPr lang="en-GB" sz="1600" dirty="0"/>
+              <a:rPr lang="en-GB" sz="2600" dirty="0">
+                <a:latin typeface="Posterama" panose="020B0504020200020000" pitchFamily="34" charset="0"/>
+                <a:cs typeface="Posterama" panose="020B0504020200020000" pitchFamily="34" charset="0"/>
+              </a:rPr>
               <a:t>will be working</a:t>
             </a:r>
           </a:p>
@@ -10687,8 +10751,8 @@
         </p:nvSpPr>
         <p:spPr>
           <a:xfrm>
-            <a:off x="3971626" y="5287088"/>
-            <a:ext cx="968022" cy="246221"/>
+            <a:off x="3538720" y="5210144"/>
+            <a:ext cx="1833835" cy="400110"/>
           </a:xfrm>
           <a:prstGeom prst="rect">
             <a:avLst/>
@@ -10703,7 +10767,10 @@
           <a:p>
             <a:pPr algn="ctr"/>
             <a:r>
-              <a:rPr lang="en-GB" sz="1600" dirty="0"/>
+              <a:rPr lang="en-GB" sz="2600" dirty="0">
+                <a:latin typeface="Posterama" panose="020B0504020200020000" pitchFamily="34" charset="0"/>
+                <a:cs typeface="Posterama" panose="020B0504020200020000" pitchFamily="34" charset="0"/>
+              </a:rPr>
               <a:t>are working</a:t>
             </a:r>
           </a:p>
@@ -10723,8 +10790,8 @@
         </p:nvSpPr>
         <p:spPr>
           <a:xfrm>
-            <a:off x="6103835" y="5287088"/>
-            <a:ext cx="1113511" cy="246221"/>
+            <a:off x="5671753" y="5210144"/>
+            <a:ext cx="2123979" cy="400110"/>
           </a:xfrm>
           <a:prstGeom prst="rect">
             <a:avLst/>
@@ -10739,7 +10806,10 @@
           <a:p>
             <a:pPr algn="ctr"/>
             <a:r>
-              <a:rPr lang="en-GB" sz="1600" dirty="0"/>
+              <a:rPr lang="en-GB" sz="2600" dirty="0">
+                <a:latin typeface="Posterama" panose="020B0504020200020000" pitchFamily="34" charset="0"/>
+                <a:cs typeface="Posterama" panose="020B0504020200020000" pitchFamily="34" charset="0"/>
+              </a:rPr>
               <a:t>were working</a:t>
             </a:r>
           </a:p>
@@ -10759,8 +10829,8 @@
         </p:nvSpPr>
         <p:spPr>
           <a:xfrm>
-            <a:off x="8198616" y="5287088"/>
-            <a:ext cx="1235531" cy="246221"/>
+            <a:off x="8248892" y="5210144"/>
+            <a:ext cx="2341988" cy="400110"/>
           </a:xfrm>
           <a:prstGeom prst="rect">
             <a:avLst/>
@@ -10775,7 +10845,10 @@
           <a:p>
             <a:pPr algn="ctr" rtl="0"/>
             <a:r>
-              <a:rPr lang="en-GB" sz="1600" dirty="0"/>
+              <a:rPr lang="en-GB" sz="2600" dirty="0">
+                <a:latin typeface="Posterama" panose="020B0504020200020000" pitchFamily="34" charset="0"/>
+                <a:cs typeface="Posterama" panose="020B0504020200020000" pitchFamily="34" charset="0"/>
+              </a:rPr>
               <a:t>will be working</a:t>
             </a:r>
           </a:p>
@@ -10865,8 +10938,8 @@
         </p:nvSpPr>
         <p:spPr>
           <a:xfrm>
-            <a:off x="527925" y="257431"/>
-            <a:ext cx="6425718" cy="492443"/>
+            <a:off x="237418" y="101793"/>
+            <a:ext cx="7025019" cy="615553"/>
           </a:xfrm>
           <a:prstGeom prst="rect">
             <a:avLst/>
@@ -10881,13 +10954,15 @@
           <a:p>
             <a:pPr algn="ctr" rtl="0"/>
             <a:r>
-              <a:rPr lang="en-GB" sz="3200" b="1" dirty="0">
-                <a:latin typeface="+mj-lt"/>
+              <a:rPr lang="en-GB" sz="4000" b="1" dirty="0">
+                <a:latin typeface="Posterama" panose="020B0504020200020000" pitchFamily="34" charset="0"/>
+                <a:cs typeface="Posterama" panose="020B0504020200020000" pitchFamily="34" charset="0"/>
               </a:rPr>
               <a:t>PRESENT PERFECT TENSE</a:t>
             </a:r>
-            <a:endParaRPr lang="en-GB" sz="3600" dirty="0">
-              <a:latin typeface="+mj-lt"/>
+            <a:endParaRPr lang="en-GB" sz="4400" dirty="0">
+              <a:latin typeface="Posterama" panose="020B0504020200020000" pitchFamily="34" charset="0"/>
+              <a:cs typeface="Posterama" panose="020B0504020200020000" pitchFamily="34" charset="0"/>
             </a:endParaRPr>
           </a:p>
         </p:txBody>
@@ -10907,7 +10982,7 @@
         <p:spPr>
           <a:xfrm>
             <a:off x="527926" y="717346"/>
-            <a:ext cx="6425717" cy="615553"/>
+            <a:ext cx="6425717" cy="738664"/>
           </a:xfrm>
           <a:prstGeom prst="rect">
             <a:avLst/>
@@ -10922,30 +10997,51 @@
           <a:p>
             <a:pPr algn="ctr" rtl="0"/>
             <a:r>
-              <a:rPr lang="uk-UA" sz="2000" dirty="0"/>
+              <a:rPr lang="uk-UA" sz="2400" dirty="0">
+                <a:latin typeface="Posterama" panose="020B0504020200020000" pitchFamily="34" charset="0"/>
+                <a:cs typeface="Posterama" panose="020B0504020200020000" pitchFamily="34" charset="0"/>
+              </a:rPr>
               <a:t>Показує, що</a:t>
             </a:r>
             <a:r>
-              <a:rPr lang="ru-RU" sz="2000" dirty="0"/>
+              <a:rPr lang="ru-RU" sz="2400" dirty="0">
+                <a:latin typeface="Posterama" panose="020B0504020200020000" pitchFamily="34" charset="0"/>
+                <a:cs typeface="Posterama" panose="020B0504020200020000" pitchFamily="34" charset="0"/>
+              </a:rPr>
               <a:t> </a:t>
             </a:r>
             <a:r>
-              <a:rPr lang="uk-UA" sz="2000" b="1" dirty="0"/>
+              <a:rPr lang="uk-UA" sz="2400" b="1" dirty="0">
+                <a:latin typeface="Posterama" panose="020B0504020200020000" pitchFamily="34" charset="0"/>
+                <a:cs typeface="Posterama" panose="020B0504020200020000" pitchFamily="34" charset="0"/>
+              </a:rPr>
               <a:t>дія відбулася</a:t>
             </a:r>
             <a:r>
-              <a:rPr lang="en-GB" sz="2000" b="1" dirty="0"/>
+              <a:rPr lang="en-GB" sz="2400" b="1" dirty="0">
+                <a:latin typeface="Posterama" panose="020B0504020200020000" pitchFamily="34" charset="0"/>
+                <a:cs typeface="Posterama" panose="020B0504020200020000" pitchFamily="34" charset="0"/>
+              </a:rPr>
               <a:t> </a:t>
             </a:r>
             <a:r>
-              <a:rPr lang="ru-UA" sz="2000" b="1" dirty="0"/>
+              <a:rPr lang="ru-UA" sz="2400" b="1" dirty="0">
+                <a:latin typeface="Posterama" panose="020B0504020200020000" pitchFamily="34" charset="0"/>
+                <a:cs typeface="Posterama" panose="020B0504020200020000" pitchFamily="34" charset="0"/>
+              </a:rPr>
               <a:t>в минулому</a:t>
             </a:r>
             <a:r>
-              <a:rPr lang="uk-UA" sz="2000" b="1" dirty="0"/>
+              <a:rPr lang="uk-UA" sz="2400" b="1" dirty="0">
+                <a:latin typeface="Posterama" panose="020B0504020200020000" pitchFamily="34" charset="0"/>
+                <a:cs typeface="Posterama" panose="020B0504020200020000" pitchFamily="34" charset="0"/>
+              </a:rPr>
               <a:t> і має зв’язок з теперішнім</a:t>
             </a:r>
-            <a:endParaRPr lang="en-GB" sz="2000" b="1" dirty="0"/>
+            <a:endParaRPr lang="en-GB" sz="2400" b="1" dirty="0">
+              <a:latin typeface="Posterama" panose="020B0504020200020000" pitchFamily="34" charset="0"/>
+              <a:cs typeface="Posterama" panose="020B0504020200020000" pitchFamily="34" charset="0"/>
+            </a:endParaRPr>
           </a:p>
         </p:txBody>
       </p:sp>
@@ -10966,20 +11062,16 @@
         </p:nvSpPr>
         <p:spPr>
           <a:xfrm>
-            <a:off x="4246018" y="1721261"/>
-            <a:ext cx="2146450" cy="560290"/>
+            <a:off x="3182112" y="1721261"/>
+            <a:ext cx="3639311" cy="560290"/>
           </a:xfrm>
           <a:prstGeom prst="roundRect">
             <a:avLst>
-              <a:gd name="adj" fmla="val 50000"/>
+              <a:gd name="adj" fmla="val 33680"/>
             </a:avLst>
           </a:prstGeom>
           <a:solidFill>
-            <a:schemeClr val="tx2">
-              <a:lumMod val="40000"/>
-              <a:lumOff val="60000"/>
-              <a:alpha val="25000"/>
-            </a:schemeClr>
+            <a:srgbClr val="EAF3F2"/>
           </a:solidFill>
           <a:ln w="9525">
             <a:noFill/>
@@ -11032,13 +11124,11 @@
           </a:xfrm>
           <a:prstGeom prst="roundRect">
             <a:avLst>
-              <a:gd name="adj" fmla="val 50000"/>
+              <a:gd name="adj" fmla="val 33680"/>
             </a:avLst>
           </a:prstGeom>
           <a:solidFill>
-            <a:schemeClr val="accent1">
-              <a:alpha val="55000"/>
-            </a:schemeClr>
+            <a:srgbClr val="66B2B0"/>
           </a:solidFill>
           <a:ln w="9525">
             <a:noFill/>
@@ -11083,8 +11173,8 @@
         </p:nvSpPr>
         <p:spPr>
           <a:xfrm>
-            <a:off x="1894763" y="1878296"/>
-            <a:ext cx="49693" cy="246221"/>
+            <a:off x="1869917" y="1816741"/>
+            <a:ext cx="99387" cy="369332"/>
           </a:xfrm>
           <a:prstGeom prst="rect">
             <a:avLst/>
@@ -11099,7 +11189,10 @@
           <a:p>
             <a:pPr algn="ctr" rtl="0"/>
             <a:r>
-              <a:rPr lang="en-GB" sz="1600" b="1" dirty="0"/>
+              <a:rPr lang="en-GB" sz="2400" b="1" dirty="0">
+                <a:latin typeface="Posterama" panose="020B0504020200020000" pitchFamily="34" charset="0"/>
+                <a:cs typeface="Posterama" panose="020B0504020200020000" pitchFamily="34" charset="0"/>
+              </a:rPr>
               <a:t>I</a:t>
             </a:r>
           </a:p>
@@ -11127,13 +11220,13 @@
           </a:xfrm>
           <a:prstGeom prst="roundRect">
             <a:avLst>
-              <a:gd name="adj" fmla="val 50000"/>
+              <a:gd name="adj" fmla="val 28784"/>
             </a:avLst>
           </a:prstGeom>
           <a:solidFill>
-            <a:schemeClr val="tx2">
+            <a:srgbClr val="C8DFDE">
               <a:alpha val="55000"/>
-            </a:schemeClr>
+            </a:srgbClr>
           </a:solidFill>
           <a:ln w="9525">
             <a:noFill/>
@@ -11181,20 +11274,16 @@
         </p:nvSpPr>
         <p:spPr>
           <a:xfrm>
-            <a:off x="4246018" y="2444301"/>
-            <a:ext cx="2146450" cy="560290"/>
+            <a:off x="3179484" y="2444301"/>
+            <a:ext cx="3708655" cy="560290"/>
           </a:xfrm>
           <a:prstGeom prst="roundRect">
             <a:avLst>
-              <a:gd name="adj" fmla="val 50000"/>
+              <a:gd name="adj" fmla="val 33680"/>
             </a:avLst>
           </a:prstGeom>
           <a:solidFill>
-            <a:schemeClr val="tx2">
-              <a:lumMod val="40000"/>
-              <a:lumOff val="60000"/>
-              <a:alpha val="25000"/>
-            </a:schemeClr>
+            <a:srgbClr val="EAF3F2"/>
           </a:solidFill>
           <a:ln w="9525">
             <a:noFill/>
@@ -11239,8 +11328,8 @@
         </p:nvSpPr>
         <p:spPr>
           <a:xfrm>
-            <a:off x="1771395" y="2601335"/>
-            <a:ext cx="296428" cy="246221"/>
+            <a:off x="1627864" y="2539780"/>
+            <a:ext cx="583494" cy="369332"/>
           </a:xfrm>
           <a:prstGeom prst="rect">
             <a:avLst/>
@@ -11255,7 +11344,10 @@
           <a:p>
             <a:pPr algn="ctr" rtl="0"/>
             <a:r>
-              <a:rPr lang="en-GB" sz="1600" b="1" dirty="0"/>
+              <a:rPr lang="en-GB" sz="2400" b="1" dirty="0">
+                <a:latin typeface="Posterama" panose="020B0504020200020000" pitchFamily="34" charset="0"/>
+                <a:cs typeface="Posterama" panose="020B0504020200020000" pitchFamily="34" charset="0"/>
+              </a:rPr>
               <a:t>You</a:t>
             </a:r>
           </a:p>
@@ -11283,13 +11375,11 @@
           </a:xfrm>
           <a:prstGeom prst="roundRect">
             <a:avLst>
-              <a:gd name="adj" fmla="val 50000"/>
+              <a:gd name="adj" fmla="val 30416"/>
             </a:avLst>
           </a:prstGeom>
           <a:solidFill>
-            <a:schemeClr val="accent1">
-              <a:alpha val="55000"/>
-            </a:schemeClr>
+            <a:srgbClr val="66B2B0"/>
           </a:solidFill>
           <a:ln w="9525">
             <a:noFill/>
@@ -11337,20 +11427,16 @@
         </p:nvSpPr>
         <p:spPr>
           <a:xfrm>
-            <a:off x="4291222" y="3167341"/>
-            <a:ext cx="2146450" cy="560290"/>
+            <a:off x="3180270" y="3167341"/>
+            <a:ext cx="3687891" cy="560290"/>
           </a:xfrm>
           <a:prstGeom prst="roundRect">
             <a:avLst>
-              <a:gd name="adj" fmla="val 50000"/>
+              <a:gd name="adj" fmla="val 38576"/>
             </a:avLst>
           </a:prstGeom>
           <a:solidFill>
-            <a:schemeClr val="tx2">
-              <a:lumMod val="40000"/>
-              <a:lumOff val="60000"/>
-              <a:alpha val="25000"/>
-            </a:schemeClr>
+            <a:srgbClr val="EAF3F2"/>
           </a:solidFill>
           <a:ln w="9525">
             <a:noFill/>
@@ -11395,8 +11481,8 @@
         </p:nvSpPr>
         <p:spPr>
           <a:xfrm>
-            <a:off x="1528479" y="3324375"/>
-            <a:ext cx="782266" cy="246221"/>
+            <a:off x="1188644" y="3262820"/>
+            <a:ext cx="1461939" cy="369332"/>
           </a:xfrm>
           <a:prstGeom prst="rect">
             <a:avLst/>
@@ -11411,7 +11497,10 @@
           <a:p>
             <a:pPr algn="ctr" rtl="0"/>
             <a:r>
-              <a:rPr lang="en-GB" sz="1600" b="1" dirty="0"/>
+              <a:rPr lang="en-GB" sz="2400" b="1" dirty="0">
+                <a:latin typeface="Posterama" panose="020B0504020200020000" pitchFamily="34" charset="0"/>
+                <a:cs typeface="Posterama" panose="020B0504020200020000" pitchFamily="34" charset="0"/>
+              </a:rPr>
               <a:t>He/She/It</a:t>
             </a:r>
           </a:p>
@@ -11439,13 +11528,13 @@
           </a:xfrm>
           <a:prstGeom prst="roundRect">
             <a:avLst>
-              <a:gd name="adj" fmla="val 50000"/>
+              <a:gd name="adj" fmla="val 30416"/>
             </a:avLst>
           </a:prstGeom>
           <a:solidFill>
-            <a:schemeClr val="tx2">
+            <a:srgbClr val="C8DFDE">
               <a:alpha val="55000"/>
-            </a:schemeClr>
+            </a:srgbClr>
           </a:solidFill>
           <a:ln w="9525">
             <a:noFill/>
@@ -11493,20 +11582,16 @@
         </p:nvSpPr>
         <p:spPr>
           <a:xfrm>
-            <a:off x="4291222" y="3890381"/>
-            <a:ext cx="2146450" cy="560290"/>
+            <a:off x="3180232" y="3890381"/>
+            <a:ext cx="3688925" cy="560290"/>
           </a:xfrm>
           <a:prstGeom prst="roundRect">
             <a:avLst>
-              <a:gd name="adj" fmla="val 50000"/>
+              <a:gd name="adj" fmla="val 35312"/>
             </a:avLst>
           </a:prstGeom>
           <a:solidFill>
-            <a:schemeClr val="tx2">
-              <a:lumMod val="40000"/>
-              <a:lumOff val="60000"/>
-              <a:alpha val="25000"/>
-            </a:schemeClr>
+            <a:srgbClr val="EAF3F2"/>
           </a:solidFill>
           <a:ln w="9525">
             <a:noFill/>
@@ -11551,8 +11636,8 @@
         </p:nvSpPr>
         <p:spPr>
           <a:xfrm>
-            <a:off x="1782296" y="4047415"/>
-            <a:ext cx="274627" cy="246221"/>
+            <a:off x="1682365" y="3985860"/>
+            <a:ext cx="474490" cy="369332"/>
           </a:xfrm>
           <a:prstGeom prst="rect">
             <a:avLst/>
@@ -11567,7 +11652,10 @@
           <a:p>
             <a:pPr algn="ctr" rtl="0"/>
             <a:r>
-              <a:rPr lang="en-GB" sz="1600" b="1" dirty="0"/>
+              <a:rPr lang="en-GB" sz="2400" b="1" dirty="0">
+                <a:latin typeface="Posterama" panose="020B0504020200020000" pitchFamily="34" charset="0"/>
+                <a:cs typeface="Posterama" panose="020B0504020200020000" pitchFamily="34" charset="0"/>
+              </a:rPr>
               <a:t>We</a:t>
             </a:r>
           </a:p>
@@ -11625,13 +11713,11 @@
           </a:xfrm>
           <a:prstGeom prst="roundRect">
             <a:avLst>
-              <a:gd name="adj" fmla="val 50000"/>
+              <a:gd name="adj" fmla="val 28784"/>
             </a:avLst>
           </a:prstGeom>
           <a:solidFill>
-            <a:schemeClr val="tx2">
-              <a:alpha val="55000"/>
-            </a:schemeClr>
+            <a:srgbClr val="66B2B0"/>
           </a:solidFill>
           <a:ln w="9525">
             <a:noFill/>
@@ -11679,20 +11765,16 @@
         </p:nvSpPr>
         <p:spPr>
           <a:xfrm>
-            <a:off x="4291222" y="4680474"/>
-            <a:ext cx="2146450" cy="560290"/>
+            <a:off x="3179290" y="4680474"/>
+            <a:ext cx="3688925" cy="560290"/>
           </a:xfrm>
           <a:prstGeom prst="roundRect">
             <a:avLst>
-              <a:gd name="adj" fmla="val 50000"/>
+              <a:gd name="adj" fmla="val 33680"/>
             </a:avLst>
           </a:prstGeom>
           <a:solidFill>
-            <a:schemeClr val="tx2">
-              <a:lumMod val="40000"/>
-              <a:lumOff val="60000"/>
-              <a:alpha val="25000"/>
-            </a:schemeClr>
+            <a:srgbClr val="EAF3F2"/>
           </a:solidFill>
           <a:ln w="9525">
             <a:noFill/>
@@ -11737,8 +11819,8 @@
         </p:nvSpPr>
         <p:spPr>
           <a:xfrm>
-            <a:off x="1721349" y="4837508"/>
-            <a:ext cx="396520" cy="246221"/>
+            <a:off x="1554927" y="4775953"/>
+            <a:ext cx="729367" cy="369332"/>
           </a:xfrm>
           <a:prstGeom prst="rect">
             <a:avLst/>
@@ -11753,7 +11835,10 @@
           <a:p>
             <a:pPr algn="ctr" rtl="0"/>
             <a:r>
-              <a:rPr lang="en-GB" sz="1600" b="1" dirty="0"/>
+              <a:rPr lang="en-GB" sz="2400" b="1" dirty="0">
+                <a:latin typeface="Posterama" panose="020B0504020200020000" pitchFamily="34" charset="0"/>
+                <a:cs typeface="Posterama" panose="020B0504020200020000" pitchFamily="34" charset="0"/>
+              </a:rPr>
               <a:t>They</a:t>
             </a:r>
           </a:p>
@@ -11773,8 +11858,8 @@
         </p:nvSpPr>
         <p:spPr>
           <a:xfrm>
-            <a:off x="4468684" y="1878296"/>
-            <a:ext cx="1765228" cy="246221"/>
+            <a:off x="3378417" y="1801352"/>
+            <a:ext cx="3342262" cy="400110"/>
           </a:xfrm>
           <a:prstGeom prst="rect">
             <a:avLst/>
@@ -11789,15 +11874,24 @@
           <a:p>
             <a:pPr algn="ctr" rtl="0"/>
             <a:r>
-              <a:rPr lang="en-GB" sz="1600" dirty="0"/>
+              <a:rPr lang="en-GB" sz="2600" dirty="0">
+                <a:latin typeface="Posterama" panose="020B0504020200020000" pitchFamily="34" charset="0"/>
+                <a:cs typeface="Posterama" panose="020B0504020200020000" pitchFamily="34" charset="0"/>
+              </a:rPr>
               <a:t>have</a:t>
             </a:r>
             <a:r>
-              <a:rPr lang="ru-UA" sz="1600" dirty="0"/>
+              <a:rPr lang="ru-UA" sz="2600" dirty="0">
+                <a:latin typeface="Posterama" panose="020B0504020200020000" pitchFamily="34" charset="0"/>
+                <a:cs typeface="Posterama" panose="020B0504020200020000" pitchFamily="34" charset="0"/>
+              </a:rPr>
               <a:t> </a:t>
             </a:r>
             <a:r>
-              <a:rPr lang="en-GB" sz="1600" dirty="0"/>
+              <a:rPr lang="en-GB" sz="2600" dirty="0">
+                <a:latin typeface="Posterama" panose="020B0504020200020000" pitchFamily="34" charset="0"/>
+                <a:cs typeface="Posterama" panose="020B0504020200020000" pitchFamily="34" charset="0"/>
+              </a:rPr>
               <a:t>written 3 books </a:t>
             </a:r>
           </a:p>
@@ -11817,8 +11911,8 @@
         </p:nvSpPr>
         <p:spPr>
           <a:xfrm>
-            <a:off x="4468684" y="2584316"/>
-            <a:ext cx="1765227" cy="246221"/>
+            <a:off x="3378416" y="2507372"/>
+            <a:ext cx="3342262" cy="400110"/>
           </a:xfrm>
           <a:prstGeom prst="rect">
             <a:avLst/>
@@ -11833,15 +11927,24 @@
           <a:p>
             <a:pPr algn="ctr" rtl="0"/>
             <a:r>
-              <a:rPr lang="en-GB" sz="1600" dirty="0"/>
+              <a:rPr lang="en-GB" sz="2600" dirty="0">
+                <a:latin typeface="Posterama" panose="020B0504020200020000" pitchFamily="34" charset="0"/>
+                <a:cs typeface="Posterama" panose="020B0504020200020000" pitchFamily="34" charset="0"/>
+              </a:rPr>
               <a:t>have</a:t>
             </a:r>
             <a:r>
-              <a:rPr lang="ru-UA" sz="1600" dirty="0"/>
+              <a:rPr lang="ru-UA" sz="2600" dirty="0">
+                <a:latin typeface="Posterama" panose="020B0504020200020000" pitchFamily="34" charset="0"/>
+                <a:cs typeface="Posterama" panose="020B0504020200020000" pitchFamily="34" charset="0"/>
+              </a:rPr>
               <a:t> </a:t>
             </a:r>
             <a:r>
-              <a:rPr lang="en-GB" sz="1600" dirty="0"/>
+              <a:rPr lang="en-GB" sz="2600" dirty="0">
+                <a:latin typeface="Posterama" panose="020B0504020200020000" pitchFamily="34" charset="0"/>
+                <a:cs typeface="Posterama" panose="020B0504020200020000" pitchFamily="34" charset="0"/>
+              </a:rPr>
               <a:t>written 3 books </a:t>
             </a:r>
           </a:p>
@@ -11861,8 +11964,8 @@
         </p:nvSpPr>
         <p:spPr>
           <a:xfrm>
-            <a:off x="4521234" y="3324375"/>
-            <a:ext cx="1660134" cy="246221"/>
+            <a:off x="3485820" y="3247431"/>
+            <a:ext cx="3127459" cy="400110"/>
           </a:xfrm>
           <a:prstGeom prst="rect">
             <a:avLst/>
@@ -11877,15 +11980,24 @@
           <a:p>
             <a:pPr algn="ctr" rtl="0"/>
             <a:r>
-              <a:rPr lang="en-GB" sz="1600" dirty="0"/>
+              <a:rPr lang="en-GB" sz="2600" dirty="0">
+                <a:latin typeface="Posterama" panose="020B0504020200020000" pitchFamily="34" charset="0"/>
+                <a:cs typeface="Posterama" panose="020B0504020200020000" pitchFamily="34" charset="0"/>
+              </a:rPr>
               <a:t>has</a:t>
             </a:r>
             <a:r>
-              <a:rPr lang="ru-UA" sz="1600" dirty="0"/>
+              <a:rPr lang="ru-UA" sz="2600" dirty="0">
+                <a:latin typeface="Posterama" panose="020B0504020200020000" pitchFamily="34" charset="0"/>
+                <a:cs typeface="Posterama" panose="020B0504020200020000" pitchFamily="34" charset="0"/>
+              </a:rPr>
               <a:t> </a:t>
             </a:r>
             <a:r>
-              <a:rPr lang="en-GB" sz="1600" dirty="0"/>
+              <a:rPr lang="en-GB" sz="2600" dirty="0">
+                <a:latin typeface="Posterama" panose="020B0504020200020000" pitchFamily="34" charset="0"/>
+                <a:cs typeface="Posterama" panose="020B0504020200020000" pitchFamily="34" charset="0"/>
+              </a:rPr>
               <a:t>written 3 books </a:t>
             </a:r>
           </a:p>
@@ -11905,8 +12017,8 @@
         </p:nvSpPr>
         <p:spPr>
           <a:xfrm>
-            <a:off x="4468684" y="4047414"/>
-            <a:ext cx="1765227" cy="246221"/>
+            <a:off x="3378416" y="3970470"/>
+            <a:ext cx="3342262" cy="400110"/>
           </a:xfrm>
           <a:prstGeom prst="rect">
             <a:avLst/>
@@ -11921,15 +12033,24 @@
           <a:p>
             <a:pPr algn="ctr" rtl="0"/>
             <a:r>
-              <a:rPr lang="en-GB" sz="1600" dirty="0"/>
+              <a:rPr lang="en-GB" sz="2600" dirty="0">
+                <a:latin typeface="Posterama" panose="020B0504020200020000" pitchFamily="34" charset="0"/>
+                <a:cs typeface="Posterama" panose="020B0504020200020000" pitchFamily="34" charset="0"/>
+              </a:rPr>
               <a:t>have</a:t>
             </a:r>
             <a:r>
-              <a:rPr lang="ru-UA" sz="1600" dirty="0"/>
+              <a:rPr lang="ru-UA" sz="2600" dirty="0">
+                <a:latin typeface="Posterama" panose="020B0504020200020000" pitchFamily="34" charset="0"/>
+                <a:cs typeface="Posterama" panose="020B0504020200020000" pitchFamily="34" charset="0"/>
+              </a:rPr>
               <a:t> </a:t>
             </a:r>
             <a:r>
-              <a:rPr lang="en-GB" sz="1600" dirty="0"/>
+              <a:rPr lang="en-GB" sz="2600" dirty="0">
+                <a:latin typeface="Posterama" panose="020B0504020200020000" pitchFamily="34" charset="0"/>
+                <a:cs typeface="Posterama" panose="020B0504020200020000" pitchFamily="34" charset="0"/>
+              </a:rPr>
               <a:t>written 3 books </a:t>
             </a:r>
           </a:p>
@@ -11949,8 +12070,8 @@
         </p:nvSpPr>
         <p:spPr>
           <a:xfrm>
-            <a:off x="4468684" y="4836316"/>
-            <a:ext cx="1765227" cy="246221"/>
+            <a:off x="3378416" y="4759372"/>
+            <a:ext cx="3342262" cy="400110"/>
           </a:xfrm>
           <a:prstGeom prst="rect">
             <a:avLst/>
@@ -11965,15 +12086,24 @@
           <a:p>
             <a:pPr algn="ctr" rtl="0"/>
             <a:r>
-              <a:rPr lang="en-GB" sz="1600" dirty="0"/>
+              <a:rPr lang="en-GB" sz="2600" dirty="0">
+                <a:latin typeface="Posterama" panose="020B0504020200020000" pitchFamily="34" charset="0"/>
+                <a:cs typeface="Posterama" panose="020B0504020200020000" pitchFamily="34" charset="0"/>
+              </a:rPr>
               <a:t>have</a:t>
             </a:r>
             <a:r>
-              <a:rPr lang="ru-UA" sz="1600" dirty="0"/>
+              <a:rPr lang="ru-UA" sz="2600" dirty="0">
+                <a:latin typeface="Posterama" panose="020B0504020200020000" pitchFamily="34" charset="0"/>
+                <a:cs typeface="Posterama" panose="020B0504020200020000" pitchFamily="34" charset="0"/>
+              </a:rPr>
               <a:t> </a:t>
             </a:r>
             <a:r>
-              <a:rPr lang="en-GB" sz="1600" dirty="0"/>
+              <a:rPr lang="en-GB" sz="2600" dirty="0">
+                <a:latin typeface="Posterama" panose="020B0504020200020000" pitchFamily="34" charset="0"/>
+                <a:cs typeface="Posterama" panose="020B0504020200020000" pitchFamily="34" charset="0"/>
+              </a:rPr>
               <a:t>written 3 books </a:t>
             </a:r>
           </a:p>
@@ -12063,8 +12193,8 @@
         </p:nvSpPr>
         <p:spPr>
           <a:xfrm>
-            <a:off x="2082404" y="450186"/>
-            <a:ext cx="7253619" cy="492443"/>
+            <a:off x="1614827" y="46931"/>
+            <a:ext cx="8284464" cy="1231106"/>
           </a:xfrm>
           <a:prstGeom prst="rect">
             <a:avLst/>
@@ -12079,13 +12209,15 @@
           <a:p>
             <a:pPr algn="ctr" rtl="0"/>
             <a:r>
-              <a:rPr lang="en-GB" sz="3200" b="1" dirty="0">
-                <a:latin typeface="+mj-lt"/>
+              <a:rPr lang="en-GB" sz="4000" b="1" dirty="0">
+                <a:latin typeface="Posterama" panose="020B0504020200020000" pitchFamily="34" charset="0"/>
+                <a:cs typeface="Posterama" panose="020B0504020200020000" pitchFamily="34" charset="0"/>
               </a:rPr>
               <a:t>PRESENT PERFECT CONTINUOUS TENSE</a:t>
             </a:r>
-            <a:endParaRPr lang="en-GB" sz="3600" dirty="0">
-              <a:latin typeface="+mj-lt"/>
+            <a:endParaRPr lang="en-GB" sz="4400" dirty="0">
+              <a:latin typeface="Posterama" panose="020B0504020200020000" pitchFamily="34" charset="0"/>
+              <a:cs typeface="Posterama" panose="020B0504020200020000" pitchFamily="34" charset="0"/>
             </a:endParaRPr>
           </a:p>
         </p:txBody>
@@ -12104,8 +12236,8 @@
         </p:nvSpPr>
         <p:spPr>
           <a:xfrm>
-            <a:off x="2411590" y="1105379"/>
-            <a:ext cx="6425717" cy="861774"/>
+            <a:off x="1795272" y="1349811"/>
+            <a:ext cx="8138160" cy="861774"/>
           </a:xfrm>
           <a:prstGeom prst="rect">
             <a:avLst/>
@@ -12120,30 +12252,51 @@
           <a:p>
             <a:pPr algn="ctr" rtl="0"/>
             <a:r>
-              <a:rPr lang="uk-UA" sz="2800" dirty="0"/>
+              <a:rPr lang="uk-UA" sz="2800" dirty="0">
+                <a:latin typeface="Posterama" panose="020B0504020200020000" pitchFamily="34" charset="0"/>
+                <a:cs typeface="Posterama" panose="020B0504020200020000" pitchFamily="34" charset="0"/>
+              </a:rPr>
               <a:t>Показує, що</a:t>
             </a:r>
             <a:r>
-              <a:rPr lang="ru-RU" sz="2800" dirty="0"/>
+              <a:rPr lang="ru-RU" sz="2800" dirty="0">
+                <a:latin typeface="Posterama" panose="020B0504020200020000" pitchFamily="34" charset="0"/>
+                <a:cs typeface="Posterama" panose="020B0504020200020000" pitchFamily="34" charset="0"/>
+              </a:rPr>
               <a:t> </a:t>
             </a:r>
             <a:r>
-              <a:rPr lang="uk-UA" sz="2800" b="1" dirty="0"/>
+              <a:rPr lang="uk-UA" sz="2800" b="1" dirty="0">
+                <a:latin typeface="Posterama" panose="020B0504020200020000" pitchFamily="34" charset="0"/>
+                <a:cs typeface="Posterama" panose="020B0504020200020000" pitchFamily="34" charset="0"/>
+              </a:rPr>
               <a:t>дія відбулася</a:t>
             </a:r>
             <a:r>
-              <a:rPr lang="en-GB" sz="2800" b="1" dirty="0"/>
+              <a:rPr lang="en-GB" sz="2800" b="1" dirty="0">
+                <a:latin typeface="Posterama" panose="020B0504020200020000" pitchFamily="34" charset="0"/>
+                <a:cs typeface="Posterama" panose="020B0504020200020000" pitchFamily="34" charset="0"/>
+              </a:rPr>
               <a:t> </a:t>
             </a:r>
             <a:r>
-              <a:rPr lang="ru-UA" sz="2800" b="1" dirty="0"/>
+              <a:rPr lang="ru-UA" sz="2800" b="1" dirty="0">
+                <a:latin typeface="Posterama" panose="020B0504020200020000" pitchFamily="34" charset="0"/>
+                <a:cs typeface="Posterama" panose="020B0504020200020000" pitchFamily="34" charset="0"/>
+              </a:rPr>
               <a:t>в минулому</a:t>
             </a:r>
             <a:r>
-              <a:rPr lang="uk-UA" sz="2800" b="1" dirty="0"/>
+              <a:rPr lang="uk-UA" sz="2800" b="1" dirty="0">
+                <a:latin typeface="Posterama" panose="020B0504020200020000" pitchFamily="34" charset="0"/>
+                <a:cs typeface="Posterama" panose="020B0504020200020000" pitchFamily="34" charset="0"/>
+              </a:rPr>
               <a:t> і триває до теперішнього моменту</a:t>
             </a:r>
-            <a:endParaRPr lang="en-GB" sz="2800" b="1" dirty="0"/>
+            <a:endParaRPr lang="en-GB" sz="2800" b="1" dirty="0">
+              <a:latin typeface="Posterama" panose="020B0504020200020000" pitchFamily="34" charset="0"/>
+              <a:cs typeface="Posterama" panose="020B0504020200020000" pitchFamily="34" charset="0"/>
+            </a:endParaRPr>
           </a:p>
         </p:txBody>
       </p:sp>
@@ -12165,19 +12318,17 @@
         <p:spPr>
           <a:xfrm>
             <a:off x="5757059" y="2529718"/>
-            <a:ext cx="2853541" cy="560290"/>
+            <a:ext cx="3085705" cy="560290"/>
           </a:xfrm>
           <a:prstGeom prst="roundRect">
             <a:avLst>
-              <a:gd name="adj" fmla="val 50000"/>
+              <a:gd name="adj" fmla="val 23888"/>
             </a:avLst>
           </a:prstGeom>
           <a:solidFill>
-            <a:schemeClr val="tx2">
-              <a:lumMod val="40000"/>
-              <a:lumOff val="60000"/>
+            <a:srgbClr val="C8DFDE">
               <a:alpha val="25000"/>
-            </a:schemeClr>
+            </a:srgbClr>
           </a:solidFill>
           <a:ln w="9525">
             <a:noFill/>
@@ -12230,13 +12381,11 @@
           </a:xfrm>
           <a:prstGeom prst="roundRect">
             <a:avLst>
-              <a:gd name="adj" fmla="val 50000"/>
+              <a:gd name="adj" fmla="val 18992"/>
             </a:avLst>
           </a:prstGeom>
           <a:solidFill>
-            <a:schemeClr val="accent1">
-              <a:alpha val="55000"/>
-            </a:schemeClr>
+            <a:srgbClr val="66B2B0"/>
           </a:solidFill>
           <a:ln w="9525">
             <a:noFill/>
@@ -12281,8 +12430,8 @@
         </p:nvSpPr>
         <p:spPr>
           <a:xfrm>
-            <a:off x="3921854" y="2625198"/>
-            <a:ext cx="73738" cy="369332"/>
+            <a:off x="3909030" y="2625198"/>
+            <a:ext cx="99386" cy="369332"/>
           </a:xfrm>
           <a:prstGeom prst="rect">
             <a:avLst/>
@@ -12290,14 +12439,17 @@
           <a:noFill/>
         </p:spPr>
         <p:txBody>
-          <a:bodyPr wrap="none" lIns="0" tIns="0" rIns="0" bIns="0" rtlCol="0" anchor="ctr">
+          <a:bodyPr wrap="square" lIns="0" tIns="0" rIns="0" bIns="0" rtlCol="0" anchor="ctr">
             <a:spAutoFit/>
           </a:bodyPr>
           <a:lstStyle/>
           <a:p>
             <a:pPr algn="ctr" rtl="0"/>
             <a:r>
-              <a:rPr lang="en-GB" sz="2400" b="1" dirty="0"/>
+              <a:rPr lang="en-GB" sz="2400" b="1" dirty="0">
+                <a:latin typeface="Posterama" panose="020B0504020200020000" pitchFamily="34" charset="0"/>
+                <a:cs typeface="Posterama" panose="020B0504020200020000" pitchFamily="34" charset="0"/>
+              </a:rPr>
               <a:t>I</a:t>
             </a:r>
           </a:p>
@@ -12325,13 +12477,13 @@
           </a:xfrm>
           <a:prstGeom prst="roundRect">
             <a:avLst>
-              <a:gd name="adj" fmla="val 50000"/>
+              <a:gd name="adj" fmla="val 25520"/>
             </a:avLst>
           </a:prstGeom>
           <a:solidFill>
-            <a:schemeClr val="tx2">
+            <a:srgbClr val="C8DEDE">
               <a:alpha val="55000"/>
-            </a:schemeClr>
+            </a:srgbClr>
           </a:solidFill>
           <a:ln w="9525">
             <a:noFill/>
@@ -12380,19 +12532,17 @@
         <p:spPr>
           <a:xfrm>
             <a:off x="5757059" y="3252758"/>
-            <a:ext cx="2853541" cy="560290"/>
+            <a:ext cx="3085705" cy="560290"/>
           </a:xfrm>
           <a:prstGeom prst="roundRect">
             <a:avLst>
-              <a:gd name="adj" fmla="val 50000"/>
+              <a:gd name="adj" fmla="val 32048"/>
             </a:avLst>
           </a:prstGeom>
           <a:solidFill>
-            <a:schemeClr val="tx2">
-              <a:lumMod val="40000"/>
-              <a:lumOff val="60000"/>
+            <a:srgbClr val="C8DFDE">
               <a:alpha val="25000"/>
-            </a:schemeClr>
+            </a:srgbClr>
           </a:solidFill>
           <a:ln w="9525">
             <a:noFill/>
@@ -12437,8 +12587,8 @@
         </p:nvSpPr>
         <p:spPr>
           <a:xfrm>
-            <a:off x="3741996" y="3348237"/>
-            <a:ext cx="433452" cy="369332"/>
+            <a:off x="3666975" y="3348237"/>
+            <a:ext cx="583494" cy="369332"/>
           </a:xfrm>
           <a:prstGeom prst="rect">
             <a:avLst/>
@@ -12446,14 +12596,17 @@
           <a:noFill/>
         </p:spPr>
         <p:txBody>
-          <a:bodyPr wrap="none" lIns="0" tIns="0" rIns="0" bIns="0" rtlCol="0" anchor="ctr">
+          <a:bodyPr wrap="square" lIns="0" tIns="0" rIns="0" bIns="0" rtlCol="0" anchor="ctr">
             <a:spAutoFit/>
           </a:bodyPr>
           <a:lstStyle/>
           <a:p>
             <a:pPr algn="ctr" rtl="0"/>
             <a:r>
-              <a:rPr lang="en-GB" sz="2400" b="1" dirty="0"/>
+              <a:rPr lang="en-GB" sz="2400" b="1" dirty="0">
+                <a:latin typeface="Posterama" panose="020B0504020200020000" pitchFamily="34" charset="0"/>
+                <a:cs typeface="Posterama" panose="020B0504020200020000" pitchFamily="34" charset="0"/>
+              </a:rPr>
               <a:t>You</a:t>
             </a:r>
           </a:p>
@@ -12481,13 +12634,11 @@
           </a:xfrm>
           <a:prstGeom prst="roundRect">
             <a:avLst>
-              <a:gd name="adj" fmla="val 50000"/>
+              <a:gd name="adj" fmla="val 28784"/>
             </a:avLst>
           </a:prstGeom>
           <a:solidFill>
-            <a:schemeClr val="accent1">
-              <a:alpha val="55000"/>
-            </a:schemeClr>
+            <a:srgbClr val="66B2B0"/>
           </a:solidFill>
           <a:ln w="9525">
             <a:noFill/>
@@ -12536,19 +12687,17 @@
         <p:spPr>
           <a:xfrm>
             <a:off x="5802263" y="3975798"/>
-            <a:ext cx="2853541" cy="560290"/>
+            <a:ext cx="3085705" cy="560290"/>
           </a:xfrm>
           <a:prstGeom prst="roundRect">
             <a:avLst>
-              <a:gd name="adj" fmla="val 50000"/>
+              <a:gd name="adj" fmla="val 22256"/>
             </a:avLst>
           </a:prstGeom>
           <a:solidFill>
-            <a:schemeClr val="tx2">
-              <a:lumMod val="40000"/>
-              <a:lumOff val="60000"/>
+            <a:srgbClr val="C8DFDE">
               <a:alpha val="25000"/>
-            </a:schemeClr>
+            </a:srgbClr>
           </a:solidFill>
           <a:ln w="9525">
             <a:noFill/>
@@ -12593,8 +12742,8 @@
         </p:nvSpPr>
         <p:spPr>
           <a:xfrm>
-            <a:off x="3373628" y="4071277"/>
-            <a:ext cx="1170193" cy="369332"/>
+            <a:off x="3227755" y="4071277"/>
+            <a:ext cx="1461940" cy="369332"/>
           </a:xfrm>
           <a:prstGeom prst="rect">
             <a:avLst/>
@@ -12602,14 +12751,17 @@
           <a:noFill/>
         </p:spPr>
         <p:txBody>
-          <a:bodyPr wrap="none" lIns="0" tIns="0" rIns="0" bIns="0" rtlCol="0" anchor="ctr">
+          <a:bodyPr wrap="square" lIns="0" tIns="0" rIns="0" bIns="0" rtlCol="0" anchor="ctr">
             <a:spAutoFit/>
           </a:bodyPr>
           <a:lstStyle/>
           <a:p>
             <a:pPr algn="ctr" rtl="0"/>
             <a:r>
-              <a:rPr lang="en-GB" sz="2400" b="1" dirty="0"/>
+              <a:rPr lang="en-GB" sz="2400" b="1" dirty="0">
+                <a:latin typeface="Posterama" panose="020B0504020200020000" pitchFamily="34" charset="0"/>
+                <a:cs typeface="Posterama" panose="020B0504020200020000" pitchFamily="34" charset="0"/>
+              </a:rPr>
               <a:t>He/She/It</a:t>
             </a:r>
           </a:p>
@@ -12637,13 +12789,13 @@
           </a:xfrm>
           <a:prstGeom prst="roundRect">
             <a:avLst>
-              <a:gd name="adj" fmla="val 50000"/>
+              <a:gd name="adj" fmla="val 32048"/>
             </a:avLst>
           </a:prstGeom>
           <a:solidFill>
-            <a:schemeClr val="tx2">
+            <a:srgbClr val="C8DEDE">
               <a:alpha val="55000"/>
-            </a:schemeClr>
+            </a:srgbClr>
           </a:solidFill>
           <a:ln w="9525">
             <a:noFill/>
@@ -12692,19 +12844,17 @@
         <p:spPr>
           <a:xfrm>
             <a:off x="5802263" y="4698838"/>
-            <a:ext cx="2853541" cy="560290"/>
+            <a:ext cx="3085705" cy="560290"/>
           </a:xfrm>
           <a:prstGeom prst="roundRect">
             <a:avLst>
-              <a:gd name="adj" fmla="val 50000"/>
+              <a:gd name="adj" fmla="val 28784"/>
             </a:avLst>
           </a:prstGeom>
           <a:solidFill>
-            <a:schemeClr val="tx2">
-              <a:lumMod val="40000"/>
-              <a:lumOff val="60000"/>
+            <a:srgbClr val="C8DFDE">
               <a:alpha val="25000"/>
-            </a:schemeClr>
+            </a:srgbClr>
           </a:solidFill>
           <a:ln w="9525">
             <a:noFill/>
@@ -12749,8 +12899,8 @@
         </p:nvSpPr>
         <p:spPr>
           <a:xfrm>
-            <a:off x="3756776" y="4794317"/>
-            <a:ext cx="403893" cy="369332"/>
+            <a:off x="3721478" y="4794317"/>
+            <a:ext cx="474490" cy="369332"/>
           </a:xfrm>
           <a:prstGeom prst="rect">
             <a:avLst/>
@@ -12758,14 +12908,17 @@
           <a:noFill/>
         </p:spPr>
         <p:txBody>
-          <a:bodyPr wrap="none" lIns="0" tIns="0" rIns="0" bIns="0" rtlCol="0" anchor="ctr">
+          <a:bodyPr wrap="square" lIns="0" tIns="0" rIns="0" bIns="0" rtlCol="0" anchor="ctr">
             <a:spAutoFit/>
           </a:bodyPr>
           <a:lstStyle/>
           <a:p>
             <a:pPr algn="ctr" rtl="0"/>
             <a:r>
-              <a:rPr lang="en-GB" sz="2400" b="1" dirty="0"/>
+              <a:rPr lang="en-GB" sz="2400" b="1" dirty="0">
+                <a:latin typeface="Posterama" panose="020B0504020200020000" pitchFamily="34" charset="0"/>
+                <a:cs typeface="Posterama" panose="020B0504020200020000" pitchFamily="34" charset="0"/>
+              </a:rPr>
               <a:t>We</a:t>
             </a:r>
           </a:p>
@@ -12823,13 +12976,11 @@
           </a:xfrm>
           <a:prstGeom prst="roundRect">
             <a:avLst>
-              <a:gd name="adj" fmla="val 50000"/>
+              <a:gd name="adj" fmla="val 27152"/>
             </a:avLst>
           </a:prstGeom>
           <a:solidFill>
-            <a:schemeClr val="tx2">
-              <a:alpha val="55000"/>
-            </a:schemeClr>
+            <a:srgbClr val="66B2B0"/>
           </a:solidFill>
           <a:ln w="9525">
             <a:noFill/>
@@ -12878,19 +13029,17 @@
         <p:spPr>
           <a:xfrm>
             <a:off x="5802263" y="5488931"/>
-            <a:ext cx="2853541" cy="560290"/>
+            <a:ext cx="3085705" cy="560290"/>
           </a:xfrm>
           <a:prstGeom prst="roundRect">
             <a:avLst>
-              <a:gd name="adj" fmla="val 50000"/>
+              <a:gd name="adj" fmla="val 28784"/>
             </a:avLst>
           </a:prstGeom>
           <a:solidFill>
-            <a:schemeClr val="tx2">
-              <a:lumMod val="40000"/>
-              <a:lumOff val="60000"/>
+            <a:srgbClr val="C8DFDE">
               <a:alpha val="25000"/>
-            </a:schemeClr>
+            </a:srgbClr>
           </a:solidFill>
           <a:ln w="9525">
             <a:noFill/>
@@ -12935,8 +13084,8 @@
         </p:nvSpPr>
         <p:spPr>
           <a:xfrm>
-            <a:off x="3666910" y="5584410"/>
-            <a:ext cx="583622" cy="369332"/>
+            <a:off x="3594038" y="5584410"/>
+            <a:ext cx="729367" cy="369332"/>
           </a:xfrm>
           <a:prstGeom prst="rect">
             <a:avLst/>
@@ -12944,14 +13093,17 @@
           <a:noFill/>
         </p:spPr>
         <p:txBody>
-          <a:bodyPr wrap="none" lIns="0" tIns="0" rIns="0" bIns="0" rtlCol="0" anchor="ctr">
+          <a:bodyPr wrap="square" lIns="0" tIns="0" rIns="0" bIns="0" rtlCol="0" anchor="ctr">
             <a:spAutoFit/>
           </a:bodyPr>
           <a:lstStyle/>
           <a:p>
             <a:pPr algn="ctr" rtl="0"/>
             <a:r>
-              <a:rPr lang="en-GB" sz="2400" b="1" dirty="0"/>
+              <a:rPr lang="en-GB" sz="2400" b="1" dirty="0">
+                <a:latin typeface="Posterama" panose="020B0504020200020000" pitchFamily="34" charset="0"/>
+                <a:cs typeface="Posterama" panose="020B0504020200020000" pitchFamily="34" charset="0"/>
+              </a:rPr>
               <a:t>They</a:t>
             </a:r>
           </a:p>
@@ -12971,8 +13123,8 @@
         </p:nvSpPr>
         <p:spPr>
           <a:xfrm>
-            <a:off x="6113136" y="2618512"/>
-            <a:ext cx="2207079" cy="369332"/>
+            <a:off x="5937478" y="2603123"/>
+            <a:ext cx="2853541" cy="400110"/>
           </a:xfrm>
           <a:prstGeom prst="rect">
             <a:avLst/>
@@ -12980,22 +13132,31 @@
           <a:noFill/>
         </p:spPr>
         <p:txBody>
-          <a:bodyPr wrap="none" lIns="0" tIns="0" rIns="0" bIns="0" rtlCol="0" anchor="ctr">
+          <a:bodyPr wrap="square" lIns="0" tIns="0" rIns="0" bIns="0" rtlCol="0" anchor="ctr">
             <a:spAutoFit/>
           </a:bodyPr>
           <a:lstStyle/>
           <a:p>
             <a:pPr algn="ctr" rtl="0"/>
             <a:r>
-              <a:rPr lang="en-GB" sz="2400" dirty="0"/>
+              <a:rPr lang="en-GB" sz="2600" dirty="0">
+                <a:latin typeface="Posterama" panose="020B0504020200020000" pitchFamily="34" charset="0"/>
+                <a:cs typeface="Posterama" panose="020B0504020200020000" pitchFamily="34" charset="0"/>
+              </a:rPr>
               <a:t>have been</a:t>
             </a:r>
             <a:r>
-              <a:rPr lang="ru-UA" sz="2400" dirty="0"/>
+              <a:rPr lang="ru-UA" sz="2600" dirty="0">
+                <a:latin typeface="Posterama" panose="020B0504020200020000" pitchFamily="34" charset="0"/>
+                <a:cs typeface="Posterama" panose="020B0504020200020000" pitchFamily="34" charset="0"/>
+              </a:rPr>
               <a:t> </a:t>
             </a:r>
             <a:r>
-              <a:rPr lang="en-GB" sz="2400" dirty="0"/>
+              <a:rPr lang="en-GB" sz="2600" dirty="0">
+                <a:latin typeface="Posterama" panose="020B0504020200020000" pitchFamily="34" charset="0"/>
+                <a:cs typeface="Posterama" panose="020B0504020200020000" pitchFamily="34" charset="0"/>
+              </a:rPr>
               <a:t>writing</a:t>
             </a:r>
           </a:p>
@@ -13015,8 +13176,8 @@
         </p:nvSpPr>
         <p:spPr>
           <a:xfrm>
-            <a:off x="6113134" y="3324532"/>
-            <a:ext cx="2207079" cy="369332"/>
+            <a:off x="5937476" y="3309143"/>
+            <a:ext cx="2853541" cy="400110"/>
           </a:xfrm>
           <a:prstGeom prst="rect">
             <a:avLst/>
@@ -13024,22 +13185,31 @@
           <a:noFill/>
         </p:spPr>
         <p:txBody>
-          <a:bodyPr wrap="none" lIns="0" tIns="0" rIns="0" bIns="0" rtlCol="0" anchor="ctr">
+          <a:bodyPr wrap="square" lIns="0" tIns="0" rIns="0" bIns="0" rtlCol="0" anchor="ctr">
             <a:spAutoFit/>
           </a:bodyPr>
           <a:lstStyle/>
           <a:p>
             <a:pPr algn="ctr"/>
             <a:r>
-              <a:rPr lang="en-GB" sz="2400" dirty="0"/>
+              <a:rPr lang="en-GB" sz="2600" dirty="0">
+                <a:latin typeface="Posterama" panose="020B0504020200020000" pitchFamily="34" charset="0"/>
+                <a:cs typeface="Posterama" panose="020B0504020200020000" pitchFamily="34" charset="0"/>
+              </a:rPr>
               <a:t>have been</a:t>
             </a:r>
             <a:r>
-              <a:rPr lang="ru-UA" sz="2400" dirty="0"/>
+              <a:rPr lang="ru-UA" sz="2600" dirty="0">
+                <a:latin typeface="Posterama" panose="020B0504020200020000" pitchFamily="34" charset="0"/>
+                <a:cs typeface="Posterama" panose="020B0504020200020000" pitchFamily="34" charset="0"/>
+              </a:rPr>
               <a:t> </a:t>
             </a:r>
             <a:r>
-              <a:rPr lang="en-GB" sz="2400" dirty="0"/>
+              <a:rPr lang="en-GB" sz="2600" dirty="0">
+                <a:latin typeface="Posterama" panose="020B0504020200020000" pitchFamily="34" charset="0"/>
+                <a:cs typeface="Posterama" panose="020B0504020200020000" pitchFamily="34" charset="0"/>
+              </a:rPr>
               <a:t>writing</a:t>
             </a:r>
           </a:p>
@@ -13059,8 +13229,8 @@
         </p:nvSpPr>
         <p:spPr>
           <a:xfrm>
-            <a:off x="6193160" y="4064591"/>
-            <a:ext cx="2047035" cy="369332"/>
+            <a:off x="6036065" y="4049202"/>
+            <a:ext cx="2633625" cy="400110"/>
           </a:xfrm>
           <a:prstGeom prst="rect">
             <a:avLst/>
@@ -13068,22 +13238,31 @@
           <a:noFill/>
         </p:spPr>
         <p:txBody>
-          <a:bodyPr wrap="none" lIns="0" tIns="0" rIns="0" bIns="0" rtlCol="0" anchor="ctr">
+          <a:bodyPr wrap="square" lIns="0" tIns="0" rIns="0" bIns="0" rtlCol="0" anchor="ctr">
             <a:spAutoFit/>
           </a:bodyPr>
           <a:lstStyle/>
           <a:p>
             <a:pPr algn="ctr"/>
             <a:r>
-              <a:rPr lang="en-GB" sz="2400" dirty="0"/>
+              <a:rPr lang="en-GB" sz="2600" dirty="0">
+                <a:latin typeface="Posterama" panose="020B0504020200020000" pitchFamily="34" charset="0"/>
+                <a:cs typeface="Posterama" panose="020B0504020200020000" pitchFamily="34" charset="0"/>
+              </a:rPr>
               <a:t>has been</a:t>
             </a:r>
             <a:r>
-              <a:rPr lang="ru-UA" sz="2400" dirty="0"/>
+              <a:rPr lang="ru-UA" sz="2600" dirty="0">
+                <a:latin typeface="Posterama" panose="020B0504020200020000" pitchFamily="34" charset="0"/>
+                <a:cs typeface="Posterama" panose="020B0504020200020000" pitchFamily="34" charset="0"/>
+              </a:rPr>
               <a:t> </a:t>
             </a:r>
             <a:r>
-              <a:rPr lang="en-GB" sz="2400" dirty="0"/>
+              <a:rPr lang="en-GB" sz="2600" dirty="0">
+                <a:latin typeface="Posterama" panose="020B0504020200020000" pitchFamily="34" charset="0"/>
+                <a:cs typeface="Posterama" panose="020B0504020200020000" pitchFamily="34" charset="0"/>
+              </a:rPr>
               <a:t>writing</a:t>
             </a:r>
           </a:p>
@@ -13103,8 +13282,8 @@
         </p:nvSpPr>
         <p:spPr>
           <a:xfrm>
-            <a:off x="6113134" y="4787630"/>
-            <a:ext cx="2207079" cy="369332"/>
+            <a:off x="5937476" y="4772241"/>
+            <a:ext cx="2853541" cy="400110"/>
           </a:xfrm>
           <a:prstGeom prst="rect">
             <a:avLst/>
@@ -13112,22 +13291,31 @@
           <a:noFill/>
         </p:spPr>
         <p:txBody>
-          <a:bodyPr wrap="none" lIns="0" tIns="0" rIns="0" bIns="0" rtlCol="0" anchor="ctr">
+          <a:bodyPr wrap="square" lIns="0" tIns="0" rIns="0" bIns="0" rtlCol="0" anchor="ctr">
             <a:spAutoFit/>
           </a:bodyPr>
           <a:lstStyle/>
           <a:p>
             <a:pPr algn="ctr"/>
             <a:r>
-              <a:rPr lang="en-GB" sz="2400" dirty="0"/>
+              <a:rPr lang="en-GB" sz="2600" dirty="0">
+                <a:latin typeface="Posterama" panose="020B0504020200020000" pitchFamily="34" charset="0"/>
+                <a:cs typeface="Posterama" panose="020B0504020200020000" pitchFamily="34" charset="0"/>
+              </a:rPr>
               <a:t>have been</a:t>
             </a:r>
             <a:r>
-              <a:rPr lang="ru-UA" sz="2400" dirty="0"/>
+              <a:rPr lang="ru-UA" sz="2600" dirty="0">
+                <a:latin typeface="Posterama" panose="020B0504020200020000" pitchFamily="34" charset="0"/>
+                <a:cs typeface="Posterama" panose="020B0504020200020000" pitchFamily="34" charset="0"/>
+              </a:rPr>
               <a:t> </a:t>
             </a:r>
             <a:r>
-              <a:rPr lang="en-GB" sz="2400" dirty="0"/>
+              <a:rPr lang="en-GB" sz="2600" dirty="0">
+                <a:latin typeface="Posterama" panose="020B0504020200020000" pitchFamily="34" charset="0"/>
+                <a:cs typeface="Posterama" panose="020B0504020200020000" pitchFamily="34" charset="0"/>
+              </a:rPr>
               <a:t>writing</a:t>
             </a:r>
           </a:p>
@@ -13147,8 +13335,8 @@
         </p:nvSpPr>
         <p:spPr>
           <a:xfrm>
-            <a:off x="6113134" y="5576532"/>
-            <a:ext cx="2207079" cy="369332"/>
+            <a:off x="5937476" y="5561143"/>
+            <a:ext cx="2853541" cy="400110"/>
           </a:xfrm>
           <a:prstGeom prst="rect">
             <a:avLst/>
@@ -13156,22 +13344,31 @@
           <a:noFill/>
         </p:spPr>
         <p:txBody>
-          <a:bodyPr wrap="none" lIns="0" tIns="0" rIns="0" bIns="0" rtlCol="0" anchor="ctr">
+          <a:bodyPr wrap="square" lIns="0" tIns="0" rIns="0" bIns="0" rtlCol="0" anchor="ctr">
             <a:spAutoFit/>
           </a:bodyPr>
           <a:lstStyle/>
           <a:p>
             <a:pPr algn="ctr"/>
             <a:r>
-              <a:rPr lang="en-GB" sz="2400" dirty="0"/>
+              <a:rPr lang="en-GB" sz="2600" dirty="0">
+                <a:latin typeface="Posterama" panose="020B0504020200020000" pitchFamily="34" charset="0"/>
+                <a:cs typeface="Posterama" panose="020B0504020200020000" pitchFamily="34" charset="0"/>
+              </a:rPr>
               <a:t>have been</a:t>
             </a:r>
             <a:r>
-              <a:rPr lang="ru-UA" sz="2400" dirty="0"/>
+              <a:rPr lang="ru-UA" sz="2600" dirty="0">
+                <a:latin typeface="Posterama" panose="020B0504020200020000" pitchFamily="34" charset="0"/>
+                <a:cs typeface="Posterama" panose="020B0504020200020000" pitchFamily="34" charset="0"/>
+              </a:rPr>
               <a:t> </a:t>
             </a:r>
             <a:r>
-              <a:rPr lang="en-GB" sz="2400" dirty="0"/>
+              <a:rPr lang="en-GB" sz="2600" dirty="0">
+                <a:latin typeface="Posterama" panose="020B0504020200020000" pitchFamily="34" charset="0"/>
+                <a:cs typeface="Posterama" panose="020B0504020200020000" pitchFamily="34" charset="0"/>
+              </a:rPr>
               <a:t>writing</a:t>
             </a:r>
           </a:p>
@@ -24351,23 +24548,12 @@
 </file>
 
 <file path=customXml/item1.xml><?xml version="1.0" encoding="utf-8"?>
-<p:properties xmlns:p="http://schemas.microsoft.com/office/2006/metadata/properties" xmlns:xsi="http://www.w3.org/2001/XMLSchema-instance" xmlns:pc="http://schemas.microsoft.com/office/infopath/2007/PartnerControls">
-  <documentManagement>
-    <_ip_UnifiedCompliancePolicyUIAction xmlns="http://schemas.microsoft.com/sharepoint/v3" xsi:nil="true"/>
-    <Image xmlns="71af3243-3dd4-4a8d-8c0d-dd76da1f02a5">
-      <Url xsi:nil="true"/>
-      <Description xsi:nil="true"/>
-    </Image>
-    <Status xmlns="71af3243-3dd4-4a8d-8c0d-dd76da1f02a5">Not started</Status>
-    <Background xmlns="71af3243-3dd4-4a8d-8c0d-dd76da1f02a5">false</Background>
-    <_ip_UnifiedCompliancePolicyProperties xmlns="http://schemas.microsoft.com/sharepoint/v3" xsi:nil="true"/>
-    <ImageTagsTaxHTField xmlns="71af3243-3dd4-4a8d-8c0d-dd76da1f02a5">
-      <Terms xmlns="http://schemas.microsoft.com/office/infopath/2007/PartnerControls"/>
-    </ImageTagsTaxHTField>
-    <TaxCatchAll xmlns="230e9df3-be65-4c73-a93b-d1236ebd677e" xsi:nil="true"/>
-    <MediaServiceKeyPoints xmlns="71af3243-3dd4-4a8d-8c0d-dd76da1f02a5" xsi:nil="true"/>
-  </documentManagement>
-</p:properties>
+<?mso-contentType ?>
+<FormTemplates xmlns="http://schemas.microsoft.com/sharepoint/v3/contenttype/forms">
+  <Display>DocumentLibraryForm</Display>
+  <Edit>DocumentLibraryForm</Edit>
+  <New>DocumentLibraryForm</New>
+</FormTemplates>
 </file>
 
 <file path=customXml/item2.xml><?xml version="1.0" encoding="utf-8"?>
@@ -24659,29 +24845,29 @@
 </file>
 
 <file path=customXml/item3.xml><?xml version="1.0" encoding="utf-8"?>
-<?mso-contentType ?>
-<FormTemplates xmlns="http://schemas.microsoft.com/sharepoint/v3/contenttype/forms">
-  <Display>DocumentLibraryForm</Display>
-  <Edit>DocumentLibraryForm</Edit>
-  <New>DocumentLibraryForm</New>
-</FormTemplates>
+<p:properties xmlns:p="http://schemas.microsoft.com/office/2006/metadata/properties" xmlns:xsi="http://www.w3.org/2001/XMLSchema-instance" xmlns:pc="http://schemas.microsoft.com/office/infopath/2007/PartnerControls">
+  <documentManagement>
+    <_ip_UnifiedCompliancePolicyUIAction xmlns="http://schemas.microsoft.com/sharepoint/v3" xsi:nil="true"/>
+    <Image xmlns="71af3243-3dd4-4a8d-8c0d-dd76da1f02a5">
+      <Url xsi:nil="true"/>
+      <Description xsi:nil="true"/>
+    </Image>
+    <Status xmlns="71af3243-3dd4-4a8d-8c0d-dd76da1f02a5">Not started</Status>
+    <Background xmlns="71af3243-3dd4-4a8d-8c0d-dd76da1f02a5">false</Background>
+    <_ip_UnifiedCompliancePolicyProperties xmlns="http://schemas.microsoft.com/sharepoint/v3" xsi:nil="true"/>
+    <ImageTagsTaxHTField xmlns="71af3243-3dd4-4a8d-8c0d-dd76da1f02a5">
+      <Terms xmlns="http://schemas.microsoft.com/office/infopath/2007/PartnerControls"/>
+    </ImageTagsTaxHTField>
+    <TaxCatchAll xmlns="230e9df3-be65-4c73-a93b-d1236ebd677e" xsi:nil="true"/>
+    <MediaServiceKeyPoints xmlns="71af3243-3dd4-4a8d-8c0d-dd76da1f02a5" xsi:nil="true"/>
+  </documentManagement>
+</p:properties>
 </file>
 
 <file path=customXml/itemProps1.xml><?xml version="1.0" encoding="utf-8"?>
-<ds:datastoreItem xmlns:ds="http://schemas.openxmlformats.org/officeDocument/2006/customXml" ds:itemID="{1024ABD0-81DD-4E89-ADBD-FD03EEA4B679}">
+<ds:datastoreItem xmlns:ds="http://schemas.openxmlformats.org/officeDocument/2006/customXml" ds:itemID="{3AD23832-4FF3-481A-BF21-E685DF749377}">
   <ds:schemaRefs>
-    <ds:schemaRef ds:uri="http://schemas.openxmlformats.org/package/2006/metadata/core-properties"/>
-    <ds:schemaRef ds:uri="http://www.w3.org/XML/1998/namespace"/>
-    <ds:schemaRef ds:uri="16c05727-aa75-4e4a-9b5f-8a80a1165891"/>
-    <ds:schemaRef ds:uri="http://purl.org/dc/elements/1.1/"/>
-    <ds:schemaRef ds:uri="http://purl.org/dc/dcmitype/"/>
-    <ds:schemaRef ds:uri="http://schemas.microsoft.com/office/infopath/2007/PartnerControls"/>
-    <ds:schemaRef ds:uri="230e9df3-be65-4c73-a93b-d1236ebd677e"/>
-    <ds:schemaRef ds:uri="71af3243-3dd4-4a8d-8c0d-dd76da1f02a5"/>
-    <ds:schemaRef ds:uri="http://schemas.microsoft.com/office/2006/documentManagement/types"/>
-    <ds:schemaRef ds:uri="http://schemas.microsoft.com/sharepoint/v3"/>
-    <ds:schemaRef ds:uri="http://schemas.microsoft.com/office/2006/metadata/properties"/>
-    <ds:schemaRef ds:uri="http://purl.org/dc/terms/"/>
+    <ds:schemaRef ds:uri="http://schemas.microsoft.com/sharepoint/v3/contenttype/forms"/>
   </ds:schemaRefs>
 </ds:datastoreItem>
 </file>
@@ -24708,9 +24894,20 @@
 </file>
 
 <file path=customXml/itemProps3.xml><?xml version="1.0" encoding="utf-8"?>
-<ds:datastoreItem xmlns:ds="http://schemas.openxmlformats.org/officeDocument/2006/customXml" ds:itemID="{3AD23832-4FF3-481A-BF21-E685DF749377}">
+<ds:datastoreItem xmlns:ds="http://schemas.openxmlformats.org/officeDocument/2006/customXml" ds:itemID="{1024ABD0-81DD-4E89-ADBD-FD03EEA4B679}">
   <ds:schemaRefs>
-    <ds:schemaRef ds:uri="http://schemas.microsoft.com/sharepoint/v3/contenttype/forms"/>
+    <ds:schemaRef ds:uri="http://schemas.openxmlformats.org/package/2006/metadata/core-properties"/>
+    <ds:schemaRef ds:uri="http://www.w3.org/XML/1998/namespace"/>
+    <ds:schemaRef ds:uri="16c05727-aa75-4e4a-9b5f-8a80a1165891"/>
+    <ds:schemaRef ds:uri="http://purl.org/dc/elements/1.1/"/>
+    <ds:schemaRef ds:uri="http://purl.org/dc/dcmitype/"/>
+    <ds:schemaRef ds:uri="http://schemas.microsoft.com/office/infopath/2007/PartnerControls"/>
+    <ds:schemaRef ds:uri="230e9df3-be65-4c73-a93b-d1236ebd677e"/>
+    <ds:schemaRef ds:uri="71af3243-3dd4-4a8d-8c0d-dd76da1f02a5"/>
+    <ds:schemaRef ds:uri="http://schemas.microsoft.com/office/2006/documentManagement/types"/>
+    <ds:schemaRef ds:uri="http://schemas.microsoft.com/sharepoint/v3"/>
+    <ds:schemaRef ds:uri="http://schemas.microsoft.com/office/2006/metadata/properties"/>
+    <ds:schemaRef ds:uri="http://purl.org/dc/terms/"/>
   </ds:schemaRefs>
 </ds:datastoreItem>
 </file>
</xml_diff>